<commit_message>
writing test - part1
</commit_message>
<xml_diff>
--- a/microservices testing.pptx
+++ b/microservices testing.pptx
@@ -112,6 +112,11 @@
       </a:defRPr>
     </a:lvl9pPr>
   </p:defaultTextStyle>
+  <p:extLst>
+    <p:ext uri="{EFAFB233-063F-42B5-8137-9DF3F51BA10A}">
+      <p15:sldGuideLst xmlns:p15="http://schemas.microsoft.com/office/powerpoint/2012/main"/>
+    </p:ext>
+  </p:extLst>
 </p:presentation>
 </file>
 
@@ -3244,51 +3249,6 @@
           <inkml:channelProperty channel="T" name="resolution" value="1" units="1/dev"/>
         </inkml:channelProperties>
       </inkml:inkSource>
-      <inkml:timestamp xml:id="ts0" timeString="2020-03-16T05:52:28.440"/>
-    </inkml:context>
-    <inkml:brush xml:id="br0">
-      <inkml:brushProperty name="width" value="0.05292" units="cm"/>
-      <inkml:brushProperty name="height" value="0.05292" units="cm"/>
-      <inkml:brushProperty name="color" value="#FF0000"/>
-    </inkml:brush>
-  </inkml:definitions>
-  <inkml:trace contextRef="#ctx0" brushRef="#br0">26760 3280 653 0,'11'-23'106'16,"8"-11"74"-16,12 1-199 15,23-7 3-15,7 3 8 16,20-7 1-16,5 5 3 16,18-5 2-16,-8 4 1 15,13-4 2-15,-16 7 0 0,1-6 2 16,-26 9 0-16,-4-1 3 15,-21 5 4-15,-6 5 3 16,-14 5 1-16,-3 5 1 16,-9 6-3-16,-4 5-3 15,-5 3-5-15,-1 2-2 16,-1-1-1-16,0 0 0 16,0-1-1-16,0 0 1 15,0 1-1-15,0 0-17 16,0 0-25-16,0 0-106 15,0 0-47-15,0-1-44 16</inkml:trace>
-  <inkml:trace contextRef="#ctx0" brushRef="#br0" timeOffset="39787.65">3255 8994 757 0,'-4'-30'209'15,"-11"1"71"-15,-7 7-226 16,-11 3-22-16,-4 15-31 15,-16 10-27-15,-8 7-20 0,-18 15-1 16,-1 2 17-16,-18 9 10 16,4-1 15-1,-13 10 2-15,8-6 2 0,-18 16 1 16,13 1 1-16,-15 17-2 16,12-3 0-16,-18 20-2 15,17-1 1-15,-13 23-3 16,17-8 1-16,-19 26 1 15,18 1 0-15,-12 24 0 16,10-13 1-16,-9 30-7 16,16-18-4-16,-9 19-3 15,17-18 0-15,1 18 0 16,14-27 8-16,3 22 3 16,19-28 4-16,-2 14 0 15,12-19 0-15,4 14 0 16,10-24-1-16,5 21-1 0,14-16 2 15,11 0-2-15,9-17 1 16,14 7-2-16,13-24 1 16,13 0-3-16,5-20 1 15,22-7-1-15,0-22 2 16,23-12-3-16,-1-20 0 16,25-13 1-16,-8-13 2 15,27-13 1-15,-14-8 4 16,25-12 6-16,-10-2 5 15,22-10 5-15,-14 1 0 0,31-10 3 16,-19 3-4-16,26-9-4 16,-18-1-6-16,32-16 1 15,-21-1-2-15,28-12-1 16,-23 4-1-16,23-18 2 16,-33 4-1-16,25-15 1 15,-28 0 1-15,23-26 3 16,-22 11 1-16,24-25 2 15,-29 7-1-15,19-16 0 16,-33 15-3-16,10-23 19 16,-28 29 5-16,-6-22 13 15,-24 14 1-15,-6-11 3 16,-25 17-17-16,-8-22-4 16,-16 32-3-16,-17-11 34 15,-20 18 0-15,-20-3 27 16,-14 31 2-16,-21-13-4 0,-8 22-37 15,-15-5-9-15,-2 18-31 16,-27-6-19-16,-12 24-10 16,-32 7-7-16,-8 15 3 15,-47 11-3-15,-2 20 12 0,-40 10 2 16,6 12 6-16,-35 18 2 16,26 7 6-16,-21 5 0 15,41 5 2-15,-28 19-3 16,29 5-2-16,-31 26-2 15,13 12 1-15,-38 36-20 16,35 2-17-16,-20 36-48 16,39-3-66-16,2 31-192 15,49-25 12-15</inkml:trace>
-  <inkml:trace contextRef="#ctx0" brushRef="#br0" timeOffset="40849.81">4733 13744 664 0,'2'21'235'16,"-8"-14"1"-16,4-9-150 15,10 1-110-15,17-5-3 16,11-7 11-16,28-22 7 16,17-14 7-16,36-30 0 15,4-8 1-15,27-29 1 16,-12 8 1-16,14-15 0 16,-25 18 0-16,14-16-2 0,-26 24-25 15,6-1-110-15,-27 23-93 16,-8 20-30-16</inkml:trace>
-  <inkml:trace contextRef="#ctx0" brushRef="#br0" timeOffset="41269.68">5169 14398 563 0,'60'-34'186'16,"-25"-21"26"-16,38-35-126 15,18-8-70-15,26-28 6 16,2-6-1-16,29-20-4 16,-12 19-6-16,8-14-4 15,-19 25-3-15,3 10-1 16,-33 32-1-16,-14 12 1 15,-28 34 2-15,-14 10 4 16,-24 15 3-16,-7 6 3 16,-7 2-3-16,3 2-5 0,-4-1-10 15,1 0-149-15,38 1-93 16,73-39-21-16</inkml:trace>
-  <inkml:trace contextRef="#ctx0" brushRef="#br0" timeOffset="45949.26">17673 12484 1423 0,'-15'-16'294'0,"2"-9"138"15,9 8-424-15,2-3-14 16,2 11-5-16,7-3-14 16,3 4-12-16,12-6-13 15,8 1-1-15,21-6 1 16,9 3 12-16,23-7 12 15,0 2 14-15,25-7 7 16,-1-2 4-16,28-6 1 16,2-4-2-16,39-7 1 15,-1 0-1-15,37-5 0 16,-9 2-1-16,32-1-1 0,-25 6 1 16,26 2 1-16,-31 7-2 15,11 6 1-15,-28 7 3 16,17 1-2-16,-33 7 0 15,10-1 0-15,-26 3 0 16,-3 0-1-16,-33 2-5 16,-6 3-17-16,-32 1-8 15,-9 4-35-15,-25 2-27 0,-9 3-111 16,-16 3-91-16,-20 8-32 16,-23 1-103-16</inkml:trace>
-  <inkml:trace contextRef="#ctx0" brushRef="#br0" timeOffset="46365.15">18567 13136 859 0,'-93'39'207'16,"45"-29"87"-16,18-8-219 15,15-2-10-15,8 2 14 16,9-3-5-16,8-3-21 16,15-5-28-16,29-11-18 0,21-6-18 15,48-16 0-15,17-4 3 16,37-14 2-16,1 2 4 16,37-21-1-16,-11 6 1 15,35-15 3-15,-12 6-1 16,30-10 1-16,-24 14 1 15,20-10 1-15,-33 17-3 0,17-4 3 16,-39 12-2-16,11 2 2 16,-39 17 0-16,1-1 1 15,-43 14 1-15,-12 1 2 16,-41 12 1-16,-17 3 6 16,-29 5 0-16,-11 3 1 15,-13 5-2-15,-3-1-55 16,-2-1-96-16,-1 3-222 15,-1 0-11-15</inkml:trace>
-  <inkml:trace contextRef="#ctx0" brushRef="#br0" timeOffset="53185.92">13476 4516 1005 0,'-113'-51'217'16,"-23"-12"87"-16,19 6-307 0,-41 10-23 15,5 18-10 1,-31 5-2-16,8 7 6 0,-23-2 6 15,23 2 23-15,-25-3 1 16,21-2 5-16,-25 3-1 16,19 1 2-16,-32 3-2 15,26 5 1-15,-36 9-3 16,24 3 1-16,-27 9-2 16,25 5 0-16,-26 4 0 15,31 6 0-15,-26 5-1 16,19 5 0-16,-22 11-1 15,23 5 1-15,-23 11 0 16,27 1 1-16,-13 14 1 16,30-6 0-16,-15 8-2 15,27-7 0-15,-18 16-1 16,21-7 2-16,-21 19-3 16,24-2 2-16,-16 16 0 15,31-4 0-15,-9 11 0 0,28-11 0 16,0 15-2-16,28-11 0 15,-4 12-2-15,27-11-1 16,-6 18 1-16,21-7 0 16,-3 17-1-16,13-15 1 15,9 20 1-15,15-14 0 0,8 11-2 16,16-19 0 0,17 19 0-16,7-22 1 15,14 7-1-15,9-19 3 0,15 10 1 16,3-25-1-1,22 10 0-15,5-19 0 0,23 7-3 16,0-14 0-16,25 8 1 16,-7-13 1-16,32 8-1 15,-11-12 2-15,27 4 0 16,-13-13 0-16,34 4 0 16,-17-11 0-16,36-1-1 15,-17-13 2-15,32 2 0 16,-25-15 0-16,26 0 0 15,-29-6 1-15,28 3-1 16,-31-6 1-16,28 2 2 0,-24-5 0 16,29-1-1-16,-25-5 1 15,25-2-2 1,-26-3-3-16,25-1 3 0,-28-2 2 16,25-3 1-16,-22-3 3 15,31-4 4-15,-21-2-1 16,28-2 1-16,-26-1-1 15,19-1-5-15,-37 4 0 16,22 1-1-16,-28 2 1 16,26 1-4-16,-23-2 4 0,37-2 0 15,-25-2-1-15,27-2 0 16,-31-2 2-16,27 4-2 16,-32 3 27-16,17 1 0 15,-30 2 0-15,21 8 1 16,-29-1 1-16,24-2-29 15,-21 3 0-15,27 1 0 16,-23-8 1-16,26 2 2 16,-23 1-1-16,22-11 2 15,-25 1-1-15,28-8 9 16,-19 0-3-16,18-7-2 16,-23 6-2-16,25-4-1 15,-31 4-8-15,20-5 1 16,-22 4 2-16,18-1 0 15,-28 2 0-15,27 4 0 16,-25 5 0-16,31-3 6 0,-13 0-2 16,29 2-1-1,-23 2-2-15,22 0 0 16,-31 4-6-16,19 4 3 0,-24-1 1 16,28 3 2-16,-21 3-2 15,22 1 0-15,-25 2-2 16,17 6 0-16,-34-1 0 0,18 6 0 15,-29 1 3-15,18 5-1 16,-30-3 0-16,24 8 0 16,-23-1 2-16,14 3-1 15,-22-6 1-15,19 3 2 16,-24-3-1-16,25-1-1 16,-16-5 0-16,19 3-1 15,-16-4-2-15,14 7 1 16,-23-4 1-16,11 1 0 15,-19-2 1-15,12-3 2 16,-19-9-2-16,18 1 0 16,-14-3 1-16,25-4-2 15,-9 1 0-15,24-2 0 16,-16-3 3-16,15-4-1 16,-30-2 2-16,10-5 1 15,-24-2 0-15,16-6 0 0,-13 1 0 16,18-8 2-16,-16-2-2 15,12-11 3-15,-25-3 2 16,4-16 0-16,-17-2 1 16,15-10-1-16,-10 2-4 15,15-15 4-15,-16 6 8 16,4-11 33-16,-23 9 17 16,-6-7 13-16,-18 13-3 15,7-14-9-15,-16 7-34 16,2-13-18-16,-11 7-14 15,-6-15-5-15,-10 10 0 0,-1-19-2 16,-8 8 4-16,-6-15 13 16,-3 10 3-16,-8-14-2 15,-8 17 0-15,-11-19-3 16,-3 9-12-16,-18-11-4 16,-7 19 0-16,-14-8-3 15,-5 17 2-15,-13-11-3 16,2 19 1-16,-20-10-2 15,0 14 2-15,-25-8-5 16,2 17-1-16,-35-8-1 16,10 16 2-16,-37-8-1 0,0 21 6 15,-33-5 1-15,14 14 3 16,-46-3-1-16,22 7 2 16,-33 1-4-16,21 10 1 15,-48 1-5-15,35 8-1 16,-33-2 2-16,31 7 3 15,-35-5 1-15,40 4 5 16,-38-1 1-16,25 4 0 16,-37 2 0-16,23 4 0 15,-34 0 1-15,41 3 0 16,-31-2 0-16,42 0 0 0,-31-3-1 16,39 1 1-16,-39 0 0 15,30-5 0-15,-31-1 0 16,34 4 0-16,-26-5 1 15,29 2-1-15,-34 1-2 16,25 4 0-16,-20-13 1 16,28 4-1-16,-10-2-2 15,32 1 1-15,-24 0 0 16,26 12-1-16,-41 1-2 16,25 3 3-16,-24 3 0 15,31 1 0-15,-42 7-12 16,36 1-2-16,-40 5-2 15,35-1-2-15,-37 8-1 16,36 1 51-16,-57 23-66 16,29 9-6-16,-20 6 3 15,30 0-1-15,-11 1-113 0,66-13-72 16,-4 2-67-16,35-9-97 16</inkml:trace>
-  <inkml:trace contextRef="#ctx0" brushRef="#br0" timeOffset="69393.8">20852 12573 167 0,'-39'12'143'0,"2"-2"-26"16,8-4-33-16,3 1-14 16,7-1-41-16,5-1 0 15,7-1-7-15,4-2-4 16,5-2-4-16,-2 0 7 16,1-1-2-16,19-1 1 15,55-9-4-15,-9 0-1 16,7-7-6-16,24-5-3 15,1-2-2-15,24-7 6 0,-7-1-1 16,25-5 1-16,-11-1-1 16,20-8 1-16,-13 3-2 15,22-5 5-15,-23 5 3 16,21-4 6-16,-15 7-2 0,21-6 1 16,-24 6-6-16,14-1-3 15,-24 7-5-15,-2-1-1 16,-34 9-4-16,-7 1 0 15,-25 6-6-15,-5 1-146 16,-19 10-50-16,-7 3-36 16</inkml:trace>
-  <inkml:trace contextRef="#ctx0" brushRef="#br0" timeOffset="69671.07">21747 13050 937 0,'2'9'265'16,"9"-13"53"-16,12-9-261 15,32-12-41 1,20-11-20-16,48-13 0 0,12-10 1 15,39-14 0-15,-1 4 1 16,26-13-1-16,-27 8-11 16,22 2-53-16,-27 13-79 15,19-8-168-15,-30 10-22 16</inkml:trace>
-  <inkml:trace contextRef="#ctx0" brushRef="#br0" timeOffset="82053.22">22660 9199 294 0,'-15'-16'67'0,"-3"-1"39"16,-4 5-86-16,-10 1-8 15,-2 7-3-15,-11 3 0 16,-5 2-12-16,-11 0 6 15,3 1 8-15,-10-1 5 16,6-3 2-16,-12 1 1 16,7-3-7-16,-17-2-5 15,5-6-4-15,-24 5-5 16,2-1 7-16,-27-1-12 16,3 2 0-16,-22 2 1 15,11 1 1-15,-26 3-13 16,15 6 5-16,-18 2-16 15,13 6-11-15,-23 4-24 16,21-2 2-16,-28-2 10 16,17-3 28-16,-24-5 32 15,16-6 32-15,-27-5 9 0,19-1-2 16,-25 0 0-16,25 1-14 16,-18-3 7-16,32 0 14 15,-14-8 9-15,25 3-7 0,-24-12 8 16,15-1-5-16,-27-10-12 15,13 5-12-15,-29-6-1 16,16 5-19-16,-21 8-11 16,20 9-6-16,-26 0 1 15,31 3 0-15,-21-1 5 16,26 1 5-16,-20-3 5 16,28 1 1-16,-21 0 14 15,25 3 0-15,-22 0 0 16,28 4-5-16,-29 5 2 15,21 4-15-15,-17 4-1 16,25 2 0-16,-15 7 1 16,37-1-2-16,-8 1 2 15,25 2-4-15,-8 12-2 16,16-1-3-16,-17 14 1 16,17 2-4-16,-12 10 2 0,13-3-2 15,-16 10 0-15,23-6-1 16,-9 10-1-16,16-3-1 15,-5 11-3-15,21-5 0 16,-5 7 0-16,13-6 0 16,-6 7 1-16,17-11 3 15,-11 16 2-15,10-4-1 16,-12 14 1-16,6-6 1 16,-6 12-1-16,15-9-2 15,-9 15 1-15,16-11-1 0,-2 5-3 16,11-13-1-16,-1 5-1 15,16-14 0-15,0 9-1 16,10-10 4-16,-2 9 1 16,9-10 1-16,2 8-1 15,5-10 0-15,7 14-2 16,7-8-3-16,4 7-4 16,7-6-1-16,9 4-3 15,5-8 0-15,11 11 1 16,8-10 4-16,12 8 1 15,2-10 3-15,13 1 2 16,-3-15 2-16,20 5 1 16,1-11 0-16,19 2 2 15,-7-8 0-15,26-2 1 0,-12-6-1 16,19-1 0 0,-8-8 2-16,30 4-1 0,-15-5 1 15,29-3-1-15,-11-3 0 16,27-3 0-16,-15-7-1 15,26-1-1-15,-16-3 1 16,26-4-1-16,-21 1 1 16,23 3-1-16,-23 1 0 15,29 4 2-15,-23 0-2 16,32 3 1-16,-19-5 1 0,39 1 1 16,-23-5-1-16,35-1 2 15,-27-1-1-15,25 5 0 16,-32 1 0-16,26 4-2 15,-31 0 1-15,33 1 1 16,-30-4 0-16,32-3 0 16,-27-6 3-16,31-4-3 15,-32-2 0-15,29-5 1 16,-30-6-2-16,26-2 0 16,-32-4 2-16,30-6 0 15,-26 0-1-15,30-1 1 16,-28-1 0-16,27-3 0 15,-30 0-2-15,22-8 0 16,-34-3-1-16,20-9 0 16,-35-3 2-16,15-19 1 15,-35 2 2-15,17-19 18 0,-32 1 5 16,24-14 2-16,-38 10-1 16,9-9 2-16,-33 12-17 15,3-5 3-15,-38 16-2 16,0-16 19-16,-25 14 9 0,-3-12 16 15,-20 5-4-15,-10-7 27 16,-12 11-11-16,-7-12 6 16,-12 9-7-16,-10-8 3 15,-7 6-30-15,-10-14 5 16,-4 11-15-16,-18-13-10 16,-3 10-4-16,-13-13 0 15,-3 13-10-15,-13-19-3 16,7 11-3-16,-14-15 0 15,10 9-1-15,-12-12-2 16,8 19-2-16,-15-5-5 16,9 14-18-16,-20-4-38 15,6 18-37-15,-25 1-280 16,-1 19 49-16</inkml:trace>
-  <inkml:trace contextRef="#ctx0" brushRef="#br0" timeOffset="92186.98">4758 14995 980 0,'-84'-25'168'15,"3"-2"139"-15,-11-5-316 16,12 10 64-16,-9-2-5 16,8 6-25-16,-19-1-15 15,12 5-11-15,-20 2-1 16,9 5-1-16,-18 2-3 15,12 5 2-15,-19 4-4 0,7 3 1 16,-19 12 0-16,15 2 1 16,-18 5 1-16,16 4 4 15,-12 8-1-15,19-3 1 16,-12 12-3-16,14 3 0 16,-10 13-3-16,17 1 1 15,-7 8-1-15,15-5 2 16,-3 12-1-16,18-9-2 15,0 9-8-15,16-8-7 16,2 12-13-16,18-12-1 16,3 12-5-16,14-12 8 0,4 14 5 15,10-14 12-15,4 11 1 16,11-13 5-16,5 11-4 16,7-11 1-16,14 6-2 15,5-8 1-15,12 8 1 16,3-13 5-16,19 8 1 15,2-8 3-15,21 2-1 16,3-12-1-16,25 3-1 16,1-12 2-16,24 0-2 15,-6-10 1-15,23 2 2 16,-10-9-1-16,18 1 1 0,-10-7 2 16,19 1 0-16,-27 1 2 15,35 1 0 1,-17-3 1-16,19 0 0 0,-16 0 0 15,37-1 1-15,-27-6-1 16,26 5-1-16,-17-5 2 16,29 5 1-16,-26 0-3 15,27 8 2-15,-24-2 0 16,26 6 0-16,-27-1-2 16,28-1 2-16,-24-2-1 0,24 0 0 15,-27-4-2-15,19 4 1 16,-27-3 0-16,19 3 0 15,-22-1 0-15,21 2 1 16,-17-6-1-16,22 3 0 16,-21-6 1-16,23 2-1 15,-23 0 0-15,19 7-1 16,-23-4 1-16,24 8 1 16,-26-1-1-16,27-3 0 15,-23-5 3-15,25-1-1 16,-19-5 0-16,27-4 0 15,-28 0 1-15,25-2 0 16,-26 2 0-16,11-4 1 16,-15 2-1-16,25-2 2 15,-21-2-2-15,27-8 1 0,-13 3-1 16,20-8 0-16,-22-6 0 16,26 0 0-16,-28 1-1 15,25 1 0-15,-29 4-1 16,24 8 2-16,-24 1-2 15,27 3 1-15,-23-3 1 16,26 3-1-16,-18-5 0 16,22-7 0-16,-17 2 1 15,26-5-1-15,-23-2 0 0,22 5-1 16,-26 1 0-16,21 3 1 16,-27 1 0-16,26-5 0 15,-28 0-1-15,32 0 1 16,-27-3 2-16,28 6 14 15,-26 1 3-15,30 2 1 16,-35-2 0-16,23 2-1 16,-28-5-14-16,28 4-2 15,-24-3 1-15,35 3 0 16,-25-1-1-16,29 0-1 16,-27 2-1-16,19 5-1 15,-34-1-1-15,20 6 1 16,-34-1 0-16,25 3 0 15,-24-6 1-15,23 4 0 16,-19-4 1-16,28 1-1 0,-31-2-1 16,21 0 0-16,-27 1-1 15,17-8 2-15,-32 2-1 16,23 1 1-16,-22 0 0 16,21 3-1-16,-23 5 0 15,24 4-1-15,-23-8-1 16,21 4 1-16,-23-2 1 15,21-4 0-15,-25-7 0 16,18 7 1-16,-27-4-1 16,14 5 2-16,-20-1 0 0,17 1 6 15,-21 0 1-15,15-3 0 16,-19 2-2-16,14-3-1 16,-19 1-4-16,17-5-2 15,-17 4 0-15,11-8 1 16,-17 2-1-16,12-3 0 15,-24 7 0-15,10-5 0 16,-15 2 0-16,12 2 4 16,-13-2 2-16,10-3 1 15,-10 0 1-15,10-2-1 16,-20 1-3-16,8 1-1 0,-11-4-2 16,13-4 1-1,-12 1-1-15,13-6 0 0,-14 7 0 16,8-6-1-1,-17 7 0-15,4-1 0 16,-14 1 0-16,6-6 0 0,-13 6 0 16,12-5 3-16,-9 1 2 15,12 0 9-15,-5-2 3 16,9-4 1-16,-8 2 1 16,7 2 0-16,-14 0-8 15,9 5-5-15,-14 2 0 16,2-1-3-16,-13 0-1 0,8-3 1 15,-11-3 2-15,14-2-1 16,-1 1-1-16,17-4 0 16,-8 2-2-16,4-1-3 15,-14 0 18-15,2-3 19 16,-12 4 2-16,6-7 2 16,-5 1 2-16,7 1-15 15,-9 0-21-15,13-6-3 16,-4 0-3-16,17-9-2 15,-6-4-5-15,12-1 1 16,-14 4 6-16,-2 0 24 16,-23 8 10-16,3-7 7 15,-14 2 3-15,5-3 7 16,-5 1-20-16,6-9-4 16,-10 7-6-16,1 3 16 15,-7 0-16-15,4-13-18 0,-4 7-17 16,-3-7 12-16,-3 6-15 15,-3-4 12-15,-8 17 17 16,-4-1 18-16,-5 8-12 16,-3-12-5-16,-4 3-10 0,-7-16-10 15,-7-1-7-15,-12-8-4 16,-5 5 0-16,-10 0-1 16,-5 5 5-16,-7-3 2 15,5 7 4-15,-6-4 2 16,1 1 1-16,-19-6-3 15,-6 6 3-15,-29-8-4 16,-7 7-1-16,-25-7-3 16,14 7 4-16,-7-3-1 15,21 11 4-15,-18-6 2 16,19 10 3-16,-19-3 0 16,3 8-3-16,-26-3 0 15,20 5-1-15,-28 2 0 16,10 6 1-16,-14-2 0 15,16 5 2-15,-24-4-1 16,17 4 0-16,-31 1 2 0,14 4-3 16,-31 2 0-16,17 4 2 15,-32 3-1-15,28 3-1 16,-23 1 4-16,26 1-1 16,-25 3-1-16,32 0 1 15,-21 1-1-15,20 2 2 16,-27 5-2-16,21 1-1 15,-33 6-4-15,21-1-3 16,-31 10-5-16,29-8 2 16,-32 6 0-16,36-1 3 15,-35 4 4-15,29-8 5 0,-41 11-14 16,34-4-6-16,-38 2-5 16,39-2-12-16,-16 5-2 15,30-7 15-15,-18 1 6 16,31-1 5-16,-25 2 12 15,18 0 2-15,-18 7 0 16,13 1 1-16,-41 4-14 16,8 6 0-16,-27 0-11 15,40-8 1-15,-4-2 4 16,56-11 13-16,7-11 1 16,28-6 11-16,-28 5-1 15,8-3-1-15,-35 6-1 16,15 1 2-16,-19 0-1 15,27-2-1-15,-3-5 0 16,35-2-1-16,-11-3 0 0,20-3-1 16,-15-1 0-16,8 2 0 15,-21 0-1-15,16 0-1 16,-17-3 1-16,13 2-1 16,-7-2 1-16,27-4 3 15,-16-2 2-15,21-1 0 16,-9 1 1-16,10-3-2 0,-32 0-2 15,6 6-5-15,-21 0-5 16,15 0 1-16,-20 0 1 16,35-2 5-16,-4-6 15 15,24-1 5-15,-26-1-2 16,13 4-2-16,-27 2-4 16,7 4-10-16,-16 0-2 15,28-4 2-15,-11-3 5 16,22-2 1-16,-17-5-3 15,12 2 2-15,-25-1-1 16,15 6-3-16,-20-4-3 16,11 9 2-16,-12-3 0 15,23 1-1-15,-22-2 0 16,18 2 0-16,-19-2 0 16,7 5-1-16,-27 1 1 15,8 5-1-15,-33 4 0 16,20 2 0-16,-22 3 1 0,17 2 0 15,-25 2-1-15,27 0-1 16,-30 2 1-16,18 0-1 16,-32 3-1-16,27 0 3 15,-31 0-1-15,22 0 1 16,-19-1-1-16,27-3 1 0,-18-4-2 16,24-3 0-16,-28-4-10 15,24-3 2-15,-32-2 2 16,27-4 5-16,-27-1 19 15,35-4 22-15,-29-4 4 16,33 2 8-16,-25-2 7 16,30 2-20-16,-19-1 5 15,35 3 4-15,-21-3-13 16,26-3-6-16,-16-1 0 16,22 4-17-16,-21-8-6 15,25 2-1-15,-16-5 0 16,31-3-2-16,-19-8-1 15,27 2-1-15,0-9 0 16,22 4-2-16,-16-2-19 16,25 11-15-16,-18 2-47 0,4 16-37 15,-26 16-78-15,12 20-20 16,-28 31-145-16,9 27 9 16</inkml:trace>
-  <inkml:trace contextRef="#ctx0" brushRef="#br0" timeOffset="104800.68">4367 16536 872 0,'-40'1'268'0,"-1"-7"104"16,24-9-251-16,2 5-18 16,12 3-25-16,10-8-49 15,10-6-45-15,25-17-5 16,18-11-3-16,37-21 5 16,9-6 9-16,41-23 2 0,-4 4 5 15,34-16 0 1,-13 3 3-16,26-14-4 0,-17 17 1 15,23-11-2-15,-24 12 3 16,20-4-25-16,-21 21-21 16,8 7-60-16,-36 23-52 15,8 20-125-15,-36 31-36 16,-9 31-50-16</inkml:trace>
-  <inkml:trace contextRef="#ctx0" brushRef="#br0" timeOffset="105038.05">7203 16637 468 0,'59'23'135'0,"7"-30"80"15,4-31-116-15,48-31 0 16,15-12 5-16,52-36-16 15,8-6-41-15,46-28-17 16,-15 18-23-16,31-15-66 16,-30 25-66-16,23 2-137 15,-38 26-34-15</inkml:trace>
-  <inkml:trace contextRef="#ctx0" brushRef="#br0" timeOffset="105299.59">11687 16254 419 0,'178'-49'165'16,"-23"8"35"-16,33-35-113 15,4 1-5-15,52-21-9 16,-4-2-50-16,58-24-8 16,-9 14-17-16,47-11-120 15,-26 17-92-15,35-7-17 16</inkml:trace>
-  <inkml:trace contextRef="#ctx0" brushRef="#br0" timeOffset="105500.52">15473 16355 855 0,'-21'77'154'0,"26"-58"84"16,46-12-252-16,35-12-4 15,76-35 5-15,41-23 19 16,98-58-55-16,22-21-85 15,83-37-107-15,-21 13-52 16</inkml:trace>
-  <inkml:trace contextRef="#ctx0" brushRef="#br0" timeOffset="105738.92">21184 16337 1193 0,'244'-77'225'0,"125"-62"106"16,61-25-467-16,192-53-223 15,24-10 24-15</inkml:trace>
-</inkml:ink>
-</file>
-
-<file path=ppt/ink/ink2.xml><?xml version="1.0" encoding="utf-8"?>
-<inkml:ink xmlns:inkml="http://www.w3.org/2003/InkML">
-  <inkml:definitions>
-    <inkml:context xml:id="ctx0">
-      <inkml:inkSource xml:id="inkSrc0">
-        <inkml:traceFormat>
-          <inkml:channel name="X" type="integer" max="29376" units="cm"/>
-          <inkml:channel name="Y" type="integer" max="16524" units="cm"/>
-          <inkml:channel name="F" type="integer" max="4095" units="dev"/>
-          <inkml:channel name="T" type="integer" max="2.14748E9" units="dev"/>
-        </inkml:traceFormat>
-        <inkml:channelProperties>
-          <inkml:channelProperty channel="X" name="resolution" value="1000.20428" units="1/cm"/>
-          <inkml:channelProperty channel="Y" name="resolution" value="1000.24213" units="1/cm"/>
-          <inkml:channelProperty channel="F" name="resolution" value="0" units="1/dev"/>
-          <inkml:channelProperty channel="T" name="resolution" value="1" units="1/dev"/>
-        </inkml:channelProperties>
-      </inkml:inkSource>
       <inkml:timestamp xml:id="ts0" timeString="2020-03-16T05:54:44.299"/>
     </inkml:context>
     <inkml:brush xml:id="br0">
@@ -3301,7 +3261,7 @@
   <inkml:trace contextRef="#ctx0" brushRef="#br0" timeOffset="2632.8">23638 8650 517 0,'-12'-30'110'0,"-11"-5"56"16,-4 3-156-16,-11-4-7 15,-2 3-5-15,-18-5-8 16,-3 3-5-16,-17-3 2 16,0 5 5-16,-16-3 5 15,3 8 4-15,-22-2-4 16,2 9 4-16,-23-5 0 16,3 4 0-16,-32 0 1 0,12 4 4 15,-24-4-3-15,10 7-1 16,-25 1-1-16,14 5-6 15,-30 3-4-15,14 5-2 16,-34 0-2-16,12 1 1 16,-35-5 4-16,12 5 3 15,-35 0-1-15,15 5 15 0,-34 4-19 16,30 8 3 0,-37 4 7-16,39 1 6 15,-36 1-4-15,38 3 18 16,-34 1-1-16,38 0-7 0,-39 5-4 15,34-1-8-15,-34 1 1 16,33-4-1-16,-28-4 16 16,37-10 16-16,-12-6 12 15,39-6-1-15,-12 1 1 16,42 1-16-16,-24 14-17 16,23 8-11-16,-23 8-1 15,27-1 0-15,-31 4 1 16,33-8-1-16,-23 1 2 15,25-5-1-15,-21 5 1 16,27-1-1-16,-16 7 1 16,32-4 0-16,-8 6 3 15,32-6-1-15,-5 2 2 0,22-5-1 16,-11 5 2 0,18-2-2-16,-14 4-1 15,12 0-1-15,-16 12-1 0,20-5-2 16,-3 8-1-16,17-4 1 15,1 1 1-15,27-11 0 16,-3 2 1-16,16-7-1 16,1 1-1-16,16-3-2 15,0 3-2-15,13-4-4 16,3 8-4-16,8-5-3 0,1 8-4 16,11-2 0-16,4 9-2 15,3-1 3-15,10 12 3 16,0-1 5-16,6 10 3 15,3-7 2-15,7 6 0 16,3-9-1-16,13 1-3 16,3-13-1-16,18 0 1 15,6-9 1-15,19-4 1 16,0-8 3-16,26-2 2 16,-4-8 2-16,20 1 1 15,-5-7 1-15,26 0 0 16,-15 0 1-16,23 0-1 15,-11-5 0-15,21 1 0 16,-23 1-1-16,24 1 0 16,-19-3 0-16,29 6 0 15,-13-5-1-15,32-1 2 0,-15-2 1 16,26 4-1-16,-26-3 1 16,17 7-2-16,-31 2 1 15,17 3-2-15,-24 0 1 0,23-1 0 16,-18-3 0-16,28-2 1 15,-18-5-1-15,25 2 1 16,-25-1 0-16,19 1 1 16,-25 3-2-16,17 2 1 15,-24 2 0-15,23 1 0 16,-20-2-1-16,23 1 2 16,-21-5-1-16,22-4 0 15,-21-3 1-15,21-3 0 16,-23-3 0-16,23-1 0 15,-22-1-1-15,21 0 1 16,-20 1 0-16,26-4 0 16,-19 1 0-16,26-3 0 15,-20-3 0-15,25-4 1 16,-26-1-1-16,22-8 1 16,-25 0 1-16,20-5 1 15,-28-5-1-15,17 3 0 0,-26 3-2 16,19 0 0-16,-25 8-2 15,19-3 2-15,-19 1-1 16,22-4 3-16,-25 1-1 16,18-7 2-16,-26 3 2 15,16-11 5-15,-24 1 0 16,12-8 2-16,-24 6-3 16,13-7 0-16,-26 7-6 15,8-1 1-15,-19 7-2 16,10-5 4-16,-21 10 5 0,5-1 17 15,-18 4 6-15,2-8 27 16,-21 5 13-16,-5-6 8 16,-15 1-10-16,-1-11 6 15,-12 4-30-15,1-6 29 16,-10 3-10-16,-2-5 13 16,-10 10-1-16,-3-11 6 15,-5-2-44-15,5-17-7 16,0 4-19-16,2-11-8 15,-2 9-7-15,-3-5 13 16,-6 12 4-16,-5-9 17 16,-2 7-3-16,-8-5-2 15,-2 10-18-15,-15-2-15 16,-10 11-25-16,-44-7-32 0,-13 8-5 16,-46-2-12-16,-12 7 0 15,-32 6-9-15,20 13 9 16,-19 14-102-16,27 16-164 15,-7 16 12-15</inkml:trace>
   <inkml:trace contextRef="#ctx0" brushRef="#br0" timeOffset="12826.91">21630 12137 806 0,'12'2'240'16,"-3"-11"43"-1,21-11-207-15,15-7-77 0,29-13-1 16,13-4-5-16,32-16 1 16,-3-1 4-16,23-15 1 15,-10 2 1-15,20-13 1 16,-17 13 0-16,13-8-1 0,-18 10 1 15,10-5 1-15,-22 11-2 16,8-5 1-16,-23 12 0 16,6 5-17-16,-22 16-28 15,5 6-89-15,-21 12-78 16,0 10-68-16,-23 12-77 16</inkml:trace>
   <inkml:trace contextRef="#ctx0" brushRef="#br0" timeOffset="13184.23">22061 12435 980 0,'-8'17'249'0,"7"-20"75"15,15-7-278-15,27-14-44 16,17-8-8-16,38-22-1 16,19-8-6-16,36-17-7 15,-2 0-5-15,27-16-4 0,-12 6 1 16,21-17 3 0,-22 7 10-16,19-7 12 15,-30 11 4-15,12-5 3 0,-32 22-2 16,0-2 1-16,-32 19-2 15,-4 6 0-15,-28 19-2 16,-7 7-29-16,-22 15-31 16,-3 6-69-16,-14 9-46 15,-1 12-111-15,-10 7-20 16</inkml:trace>
-  <inkml:trace contextRef="#ctx0" brushRef="#br0" timeOffset="22460.13">23532 13003 603 0,'41'-31'159'16,"19"-13"60"-16,5-3-180 16,21-14 0-16,1 0-9 15,22-10-18-15,-7 6-11 0,24-10 0 16,-6 10 0-16,22-9 0 15,-18 9-1-15,14-10 1 16,-23 11-1-16,6-4-2 16,-28 13-1-16,3 2 0 15,-25 17-2-15,-4 6-43 16,-23 12-40-16,-8 9-130 16,-21 11-13-16</inkml:trace>
+  <inkml:trace contextRef="#ctx0" brushRef="#br0" timeOffset="22460.12">23532 13003 603 0,'41'-31'159'16,"19"-13"60"-16,5-3-180 16,21-14 0-16,1 0-9 15,22-10-18-15,-7 6-11 0,24-10 0 16,-6 10 0-16,22-9 0 15,-18 9-1-15,14-10 1 16,-23 11-1-16,6-4-2 16,-28 13-1-16,3 2 0 15,-25 17-2-15,-4 6-43 16,-23 12-40-16,-8 9-130 16,-21 11-13-16</inkml:trace>
   <inkml:trace contextRef="#ctx0" brushRef="#br0" timeOffset="22817.49">23313 13558 899 0,'-32'20'207'16,"14"-13"80"-16,15-7-266 15,10 0-27-15,13-3-4 16,20-12 3-16,20-13-3 16,44-18 6-16,15-14 11 15,36-29-1-15,4-5-3 16,30-18 0-16,-16 7-2 16,22-19 2-16,-24 18-2 0,17-11 3 15,-33 19 1-15,10-3 3 16,-31 23 0-16,3 1 0 15,-31 22-2-15,-7 6-3 16,-29 14-4-16,-9 8-1 16,-26 13-3-16,-5 5-68 15,-11 6-82-15,2 4-132 16,-9 1-51-16</inkml:trace>
   <inkml:trace contextRef="#ctx0" brushRef="#br0" timeOffset="33741.14">25792 15109 733 0,'51'-10'250'15,"-16"-15"21"-15,18-17-168 16,17-2-111-16,25-13 0 16,3 7-5-16,26-5-23 15,-4 2-4-15,16-14-25 16,-13 7-17-16,15-9-41 16,-15 5-6-16,9 0-50 15,-19 13-8-15,7 0 4 16,-22 12-15-16</inkml:trace>
   <inkml:trace contextRef="#ctx0" brushRef="#br0" timeOffset="34173.91">26027 15893 1206 0,'0'3'277'0,"4"-9"98"15,9-7-356-15,28-21-25 16,18-9-7-16,40-31-4 16,18-8 5-16,36-18 3 15,-9 8 3-15,22-12 2 16,-22 18-1-16,17-10 3 15,-21 18 0-15,11-1 3 16,-28 16-1-16,3 6 2 16,-29 19-2-16,-10 5 3 15,-28 13-1-15,-8 5 0 16,-23 6-1-16,-8 3 2 16,-11 5-1-16,-4 1 1 15,-5 0 2-15,-1 0 0 16,1 0-1-16,-1 0 0 0,-1-1-4 15,1 1-17-15,0 0-23 16,0 0-56-16,0 0-52 16,1 0-218-16,0 0 15 15</inkml:trace>
@@ -3313,7 +3273,7 @@
 </inkml:ink>
 </file>
 
-<file path=ppt/ink/ink3.xml><?xml version="1.0" encoding="utf-8"?>
+<file path=ppt/ink/ink2.xml><?xml version="1.0" encoding="utf-8"?>
 <inkml:ink xmlns:inkml="http://www.w3.org/2003/InkML">
   <inkml:definitions>
     <inkml:context xml:id="ctx0">
@@ -3360,7 +3320,7 @@
 </inkml:ink>
 </file>
 
-<file path=ppt/ink/ink4.xml><?xml version="1.0" encoding="utf-8"?>
+<file path=ppt/ink/ink3.xml><?xml version="1.0" encoding="utf-8"?>
 <inkml:ink xmlns:inkml="http://www.w3.org/2003/InkML">
   <inkml:definitions>
     <inkml:context xml:id="ctx0">
@@ -3387,10 +3347,10 @@
     </inkml:brush>
   </inkml:definitions>
   <inkml:trace contextRef="#ctx0" brushRef="#br0">13623 8366 201 0,'12'-3'64'0,"0"-4"16"16,0 2-61-16,5 3-1 16,3 3-6-16,9 2-10 15,1-1-1-15,11 0 0 0,2-1 0 16,10-4 1-16,-3-3 0 16,11-4 3-16,-5-3 5 15,12-3 13-15,-7-1 8 16,12-3 8-1,-6 4 0-15,10-3-5 0,-4 4-13 16,11 2-8-16,-7 2-10 16,15 0 0-16,-7 3-2 15,8 0-1-15,-11 2 2 0,12 2-2 16,-13 3 0 0,10-3 0-16,-10-1 1 0,10-2 0 15,-12 0 2-15,10-2 11 16,-12 3 2-16,11-1 4 15,-13 0 1-15,11 2-1 16,-8-1-10-16,9 0-3 16,-8 4-4-16,6-3-2 15,-11 2 0-15,10 3 0 16,-10-2-1-16,6-1 1 16,-5 6 0-16,11-4 0 15,-8 0 0-15,12 2 0 16,-8-2-1-16,4-5 1 15,-10 4 1-15,4 0-1 16,-14 1 0-16,7 2 2 16,-8 0-1-16,8-2 3 15,-10-2 1-15,10 0 3 0,-10-3 4 16,9 4 11-16,-9-5 4 16,7-1 15-16,-10 1 4 15,-1-2 7-15,-13 2-8 16,-6 2-3-16,-12 2-15 15,-1 1-7-15,-9 4-11 0,-2-4-3 16,-3 4 1-16,-5-2 9 16,-5-1 3-16,0 0 1 15,-3 1-2-15,0 0-11 16,0 0-22-16,0 0-65 16,0 0-29-16,0 1-138 15,0 0 3-15,1 13-60 16</inkml:trace>
-  <inkml:trace contextRef="#ctx0" brushRef="#br0" timeOffset="1486.69">21753 8173 513 0,'-5'-4'104'0,"-1"1"30"16,1 3-160-1,4 0-29-15,0 0-7 0,0 0-10 16,0 0 17-16,0 0 13 16,-1 1 21-16,2 0 26 15,2 0 22-15,6 3 17 16,18 1 3-16,48 2 11 15,-35-12-11-15,13-1-3 16,0-1-15-16,12 0-3 0,-4-1-13 16,15 0-5-16,-4 1-6 15,15 5 0-15,-5-2-2 16,12 3 0-16,-6-1 0 16,11 2 0-16,-16-1 1 15,11 3-1-15,-10-1 1 16,13-2 0-16,-11-3-1 15,16 3 1-15,-7-6 1 16,13 3 0-16,-12-1-1 16,12 2 2-16,-15-2-2 0,9 5 2 15,-12 1-1-15,15-2 0 16,-12 6-1-16,15-4 2 16,-12-1-1-16,9 0 0 15,-13 1-1-15,8-2 1 16,-16 0-1-16,13 1 0 15,-10 0 1-15,13 3-1 16,-12-3 1-16,12 2-1 16,-13 4 0-16,10-3 2 15,-12 0 0-15,13 2 1 16,-11-1 0-16,10-3 0 16,-13 2-1-16,9-5 0 15,-13-1-2-15,8 2 2 16,-14-3-1-16,13 3 1 15,-9 1 0-15,11-1-1 16,-2 0 1-16,14 2 0 0,-11-2-2 16,8 0 2-16,-12 1 1 15,2-4 3-15,-13 2 2 16,9 3 4-16,-12-2-1 16,8 2 1-16,-10-1-1 15,4-2 14-15,-15-3 6 16,-3 3 20-16,-16-1 3 0,-1-1 4 15,-10 3-9-15,-2-1-14 16,-4 4-19-16,-2-2-7 16,-6 2-5-16,-4-3-6 15,-4 2 5-15,-3-4 0 16,-2 0-8-16,-2 2-90 16,1 0-71-16,-1 1-92 15,-1 1-81-15</inkml:trace>
+  <inkml:trace contextRef="#ctx0" brushRef="#br0" timeOffset="1486.68">21753 8173 513 0,'-5'-4'104'0,"-1"1"30"16,1 3-160-1,4 0-29-15,0 0-7 0,0 0-10 16,0 0 17-16,0 0 13 16,-1 1 21-16,2 0 26 15,2 0 22-15,6 3 17 16,18 1 3-16,48 2 11 15,-35-12-11-15,13-1-3 16,0-1-15-16,12 0-3 0,-4-1-13 16,15 0-5-16,-4 1-6 15,15 5 0-15,-5-2-2 16,12 3 0-16,-6-1 0 16,11 2 0-16,-16-1 1 15,11 3-1-15,-10-1 1 16,13-2 0-16,-11-3-1 15,16 3 1-15,-7-6 1 16,13 3 0-16,-12-1-1 16,12 2 2-16,-15-2-2 0,9 5 2 15,-12 1-1-15,15-2 0 16,-12 6-1-16,15-4 2 16,-12-1-1-16,9 0 0 15,-13 1-1-15,8-2 1 16,-16 0-1-16,13 1 0 15,-10 0 1-15,13 3-1 16,-12-3 1-16,12 2-1 16,-13 4 0-16,10-3 2 15,-12 0 0-15,13 2 1 16,-11-1 0-16,10-3 0 16,-13 2-1-16,9-5 0 15,-13-1-2-15,8 2 2 16,-14-3-1-16,13 3 1 15,-9 1 0-15,11-1-1 16,-2 0 1-16,14 2 0 0,-11-2-2 16,8 0 2-16,-12 1 1 15,2-4 3-15,-13 2 2 16,9 3 4-16,-12-2-1 16,8 2 1-16,-10-1-1 15,4-2 14-15,-15-3 6 16,-3 3 20-16,-16-1 3 0,-1-1 4 15,-10 3-9-15,-2-1-14 16,-4 4-19-16,-2-2-7 16,-6 2-5-16,-4-3-6 15,-4 2 5-15,-3-4 0 16,-2 0-8-16,-2 2-90 16,1 0-71-16,-1 1-92 15,-1 1-81-15</inkml:trace>
   <inkml:trace contextRef="#ctx0" brushRef="#br0" timeOffset="2598.61">5586 9238 712 0,'54'33'234'16,"-80"-41"28"-16,25 4-182 15,1 3-78-15,1 2-42 16,-1-1-8-16,0 0-1 16,2 0 5-16,13 2 5 0,16 5 35 15,52 10 2-15,-33-10 2 16,16 0-1-16,3-2-1 16,14-3 1-16,-2-4 0 15,17-6-1-15,0-4 1 0,27-6 0 16,1-3 1-16,29-7-1 15,-6-1 2-15,21-2 0 16,-11 2-1-16,19-2 0 16,-21 7 0-16,20 0-1 15,-19 2 0-15,15-3 2 16,-23 4 0-16,10-7 0 16,-27 4 1-16,5-5 2 15,-31 3 3-15,-1-2 13 16,-21 6 3-16,-6-3 7 15,-24 6-1-15,0 1 0 16,-19 4-12-16,-1 1-5 16,-10 5-5-16,3 1-4 15,-5 4-15-15,5-1-62 16,-3 3-63-16,12 4-112 16,-3 2-45-16</inkml:trace>
   <inkml:trace contextRef="#ctx0" brushRef="#br0" timeOffset="4290.83">2196 4779 838 0,'21'35'37'15,"-18"-12"143"-15,15 7-216 16,5 13-71-16,11 35 96 16,2 14 14-16,0 25-1 15,-5-3 3-15,0 13 2 16,-12-23 0-16,-9-10 6 16,-4-30 14-16,-6-19 86 15,-5-28 27-15,-4-16 19 16,1-12-7-16,-6-30-16 0,-2-19-90 15,0-39-33-15,0-16-31 16,3-30-4-16,7 4 2 16,0 2 3-16,4 35 5 15,5 21 13-15,-3 33 0 16,2 23-13-16,0 17-6 0,9 14-4 16,3 4-5-16,15 17-2 15,8 11 16-15,10 25 0 16,-3 7 5-16,6 21 2 15,-8-6 3-15,2 1 0 16,-10-19 4-16,-2-14-1 16,-11-22 1-16,-5-10-1 15,-8-12 4-15,-1-14 8 16,0-11 2-16,5-28 2 16,2-21-3-16,9-41-27 15,-1-4-12-15,-8-13-1 16,-6 18 8-16,-2 15 18 15,-11 42 26-15,2 11-6 16,3 24-14-16,8 13-15 16,7 13-15-16,14 17-9 15,10 12 11-15,21 17 11 0,2 9 7 16,8 10 0-16,-6-14 6 16,-1-3 0-16,-13-17 1 15,-5-16 2-15,-10-19 0 16,0-19 1-16,-6-15 0 15,1-31-84-15,-3-16-203 16,-5-36 38-16</inkml:trace>
-  <inkml:trace contextRef="#ctx0" brushRef="#br0" timeOffset="4629.97">4101 4072 1483 0,'8'-2'201'0,"-2"2"116"0,-16 2-497 15,17 26 8 1,4 12 44-16,8 27 4 0,5 14 79 16,8 20 49-16,-1-11-5 15,6 6-14-15,-7-23-15 16,-2-2-33-16,-6-23-18 16,-4-11-16-16,-10-19 43 15,-9-13-130-15,-9-18-24 16,-4-37 16-16</inkml:trace>
+  <inkml:trace contextRef="#ctx0" brushRef="#br0" timeOffset="4629.96">4101 4072 1483 0,'8'-2'201'0,"-2"2"116"0,-16 2-497 15,17 26 8 1,4 12 44-16,8 27 4 0,5 14 79 16,8 20 49-16,-1-11-5 15,6 6-14-15,-7-23-15 16,-2-2-33-16,-6-23-18 16,-4-11-16-16,-10-19 43 15,-9-13-130-15,-9-18-24 16,-4-37 16-16</inkml:trace>
   <inkml:trace contextRef="#ctx0" brushRef="#br0" timeOffset="4751.41">4017 3598 808 0,'0'-6'-62'0,"5"6"67"15,8 7-260-15,7 15-101 16</inkml:trace>
   <inkml:trace contextRef="#ctx0" brushRef="#br0" timeOffset="5066.38">4813 3425 756 0,'0'1'70'15,"-2"22"113"-15,0 19-223 16,0 28-6-16,1 12 45 16,-1 17 4-16,4-5 3 0,10 2 2 15,3-25-2 1,10-7 8-16,6-22 3 0,12-16 13 15,-2-19 2 1,13-16 5-16,-1-13-4 0,16-22-7 16,-5-6-36-16,15-21-213 15,-10-4 57-15</inkml:trace>
   <inkml:trace contextRef="#ctx0" brushRef="#br0" timeOffset="5402.2">5437 3105 1057 0,'1'-26'165'0,"19"-7"112"15,13 6-326-15,21 4-4 16,10 8 12-16,16 12-2 0,-7 11 14 16,3 16 0-16,-10 8 10 15,0 15 4-15,-17 1 5 16,-3 11 1-16,-15-9 4 15,-8 2 3-15,-17-11 2 16,-9-7 9-16,-6-12 18 16,-8-8 26-16,-1-9 22 15,-3-11-4-15,4-8-22 16,0-22-47-16,7-16-38 16,12-32-77-16,10-8-10 15,14-6 9-15,7 13 28 0,6 7-2 16,-1 30 12-16,13 4-96 15,0 5-11-15,10 2-74 16</inkml:trace>
@@ -3398,9 +3358,9 @@
   <inkml:trace contextRef="#ctx0" brushRef="#br0" timeOffset="6743.83">3917 5392 708 0,'-3'8'3'15,"17"-10"141"-15,12-4-229 0,24-8 36 16,18-8 50-16,33-12 5 15,11-9-3-15,42-25-2 16,0-8-2 0,40-23 0-16,-12 0 0 0,36-31 4 15,-29 7 9-15,23-15 22 16,-22 6 7-16,29-30 11 16,-25 21-1-16,33-21-6 15,-18 7-22-15,22-13-5 16,-32 24-11-16,9-18-2 15,-34 25-2-15,-6-5-1 16,-42 18 0-16,-3-16-1 16,-36 25 1-16,-15-13 5 15,-24 14 1-15,-12-13 4 16,-20 23 10-16,-18-2 27 16,-10 21 47-16,-21-8-3 15,-17 25-6-15,-29 1-16 0,-10 9-31 16,-34 0-53-16,-8 21 4 15,-29 5 5-15,2 11 10 16,-33 9 1-16,10 7 3 16,-41 10-2-16,14 6-3 15,-41 17-6-15,16 7 0 16,-45 22 2-16,36 5-1 16,-50 23-1-16,27-1 3 15,-31 24-4-15,35 1-3 16,-40 21-4-16,52-1-4 0,-23 35-1 15,34-12 0-15,-17 36 0 16,38-17 3-16,-12 30 4 16,53-16-2-16,-10 20-6 15,41-29 3-15,11 22-3 16,31-35-4-16,-3 23-1 16,37-27 7-16,4 15-5 15,21-15 3-15,12 18-8 16,16-37-1-16,21 18-9 15,14-27 0-15,19 5-3 16,12-27 11-16,24 3 3 16,4-33 10-16,31-4 4 15,9-25 5-15,33-17-1 16,1-24 4-16,41-24-1 16,-4-20 3-16,43-31-1 15,-12-9 1-15,41-32 2 0,-16-7-1 16,42-28-1-16,-28 1 2 15,35-31-2-15,-32 19 1 16,27-19 6-16,-46 18 5 16,3-3 4-16,-39 37 1 0,-6-5 2 15,-52 36-6-15,-5 10-3 16,-39 25-5-16,-9 9-31 16,-32 18-39-16,-4 7-181 15,-17 6 19-15</inkml:trace>
   <inkml:trace contextRef="#ctx0" brushRef="#br0" timeOffset="7787.68">7095 3612 14 0,'-22'7'70'15,"6"-5"12"-15,3 0 15 16,5 0-5-16,2-2 8 16,6 0-38-16,-1 0-11 15,1-2-17-15,0 1-2 16,1-1-14-16,25-14-5 16,47-53-7-16,-16 25 3 15,2 1 4-15,21-6 1 16,3 9-1-16,16-5-3 15,-3 6-1-15,19-5-3 16,-11 10-3-16,14-5-3 16,-11 11 0-16,15 5-1 15,-15 10 0-15,14 11-2 16,-12 9 2-16,14 10-2 16,-12 7 1-16,12 12-2 0,-12 0 3 15,16 5-2-15,-10 1 2 16,15 1 0-16,-9-10 1 15,27-1 0-15,-8-10 1 16,25-10 3-16,-4-13-1 16,30-13 2-16,-13-10 0 15,24-17 0-15,-18-5-1 0,17-15 1 16,-30-1 0-16,9-10 1 16,-34 11 0-16,-3 5 0 15,-42 12 0-15,-12 10-5 16,-35 16-10-16,-19 2-18 15,-20 11-2-15,-15 2-130 16,-11 2 28-16</inkml:trace>
   <inkml:trace contextRef="#ctx0" brushRef="#br0" timeOffset="8094.87">11307 2694 689 0,'70'-2'128'16,"11"-2"73"-16,0 8-210 15,17 18 0-15,-8 10 3 16,5 22-2-16,-21 7 0 15,-7 22 0-15,-24-1 2 16,-13 21 1-16,-23-9 2 16,-15 14 0-16,-11-17-1 0,-8 0-22 15,0-22-28-15,5 1-81 16,12-21-55 0,8-17-34-16</inkml:trace>
-  <inkml:trace contextRef="#ctx0" brushRef="#br0" timeOffset="8733.37">13325 2846 777 0,'48'2'138'15,"-30"0"84"-15,-2 5-219 0,1 5-34 16,4 8 25-16,0 8 1 15,-1 7 1-15,-5 0 3 16,-3-5 1-16,-5-10 2 16,-2-3 9-16,-2-11 14 15,-2-2 53-15,-1-5 17 16,0 0-3-16,0-1-12 16,1-10-25-16,7-27-65 15,17-57-47-15,1 25-1 16,12-26 2-16,3 2 12 15,11-8 16-15,-1 16 39 0,1 5 7 16,-8 30 1-16,1 12-6 16,-7 21-5-16,7 12-13 15,-4 20-5-15,9 19-3 16,-4 8 5-16,3 18 1 16,-8 3 5-16,-1 6 1 15,-11-10 2-15,0 0 1 16,-8-16 0-16,-1-6 3 15,-4-18 2-15,-1-7 8 16,-4-11 6-16,4-10 6 16,0-10 0-16,10-15-1 15,4-12-10-15,6-18-9 16,-2-3-7-16,2-9-1 16,-9 8 1-16,1 2 12 15,-10 19 8-15,-2 7-3 0,-5 19-7 16,8 12-3-1,1 13-15-15,17 14-10 0,8 12 1 16,17 16 5-16,-2 8 3 16,11 13-9-16,-9 1-9 15,4 8-43-15,-11-10-19 16,-2-7-56-16,-12-20-12 0,1-32-105 16,-4-31 42-16,1-42-45 15</inkml:trace>
+  <inkml:trace contextRef="#ctx0" brushRef="#br0" timeOffset="8733.36">13325 2846 777 0,'48'2'138'15,"-30"0"84"-15,-2 5-219 0,1 5-34 16,4 8 25-16,0 8 1 15,-1 7 1-15,-5 0 3 16,-3-5 1-16,-5-10 2 16,-2-3 9-16,-2-11 14 15,-2-2 53-15,-1-5 17 16,0 0-3-16,0-1-12 16,1-10-25-16,7-27-65 15,17-57-47-15,1 25-1 16,12-26 2-16,3 2 12 15,11-8 16-15,-1 16 39 0,1 5 7 16,-8 30 1-16,1 12-6 16,-7 21-5-16,7 12-13 15,-4 20-5-15,9 19-3 16,-4 8 5-16,3 18 1 16,-8 3 5-16,-1 6 1 15,-11-10 2-15,0 0 1 16,-8-16 0-16,-1-6 3 15,-4-18 2-15,-1-7 8 16,-4-11 6-16,4-10 6 16,0-10 0-16,10-15-1 15,4-12-10-15,6-18-9 16,-2-3-7-16,2-9-1 16,-9 8 1-16,1 2 12 15,-10 19 8-15,-2 7-3 0,-5 19-7 16,8 12-3-1,1 13-15-15,17 14-10 0,8 12 1 16,17 16 5-16,-2 8 3 16,11 13-9-16,-9 1-9 15,4 8-43-15,-11-10-19 16,-2-7-56-16,-12-20-12 0,1-32-105 16,-4-31 42-16,1-42-45 15</inkml:trace>
   <inkml:trace contextRef="#ctx0" brushRef="#br0" timeOffset="8876.98">15678 1539 432 0,'17'-56'277'0,"-2"15"-73"15,-7 31-72-15,5 32-118 16,3 12-39-16,15 48 5 16,3 23 18-16,6 43-22 15,0 4-41-15,10 30-137 16,-12-32 8-16</inkml:trace>
-  <inkml:trace contextRef="#ctx0" brushRef="#br0" timeOffset="9732.35">15091 3184 726 0,'22'19'36'0,"2"3"128"16,3 2-227-16,11 9 22 15,-5 3 46-15,4 7-2 16,-8-8 3-16,-3 0 5 0,-8-10 2 16,-4-3 4-16,-8-9 1 15,-1-3 16-15,-4-6 16 16,0-2 34-16,-1-3 10 16,0 1 10-16,0-1-17 15,0 0-27-15,2-2-39 16,17-31-17-16,50-46-12 15,-24 22-1-15,-6 4 5 16,4 2 2-16,-7 16 0 0,1 6-7 16,-6 12-2-16,3 11-4 15,-2 11-1-15,8 8-2 16,-4 8 7-16,6 14-1 16,-4 2 5-16,4 12 2 15,-10-2 3-15,3 7 2 16,-11-11 0-16,-2 3 2 15,-8-13 1-15,-4-7 5 16,-6-14 6-16,-2-4 29 16,-2-8 15-16,0-14-4 15,2-8-10-15,2-23-21 16,2-6-27-16,6-25-17 16,0-1 2-16,7-12 6 15,2 16 16-15,1-1 0 0,-1 28 2 16,6 11-2-16,-3 22 0 15,12 11-8-15,1 10-2 16,14 11-3-16,0 10 1 16,6 18-2-16,-7 3-6 15,-1 14-32-15,-9-3-19 16,-7-4-65-16,-15-18-48 16,-1-13-59-16,-8-20-7 15,-5-33-40-15</inkml:trace>
+  <inkml:trace contextRef="#ctx0" brushRef="#br0" timeOffset="9732.34">15091 3184 726 0,'22'19'36'0,"2"3"128"16,3 2-227-16,11 9 22 15,-5 3 46-15,4 7-2 16,-8-8 3-16,-3 0 5 0,-8-10 2 16,-4-3 4-16,-8-9 1 15,-1-3 16-15,-4-6 16 16,0-2 34-16,-1-3 10 16,0 1 10-16,0-1-17 15,0 0-27-15,2-2-39 16,17-31-17-16,50-46-12 15,-24 22-1-15,-6 4 5 16,4 2 2-16,-7 16 0 0,1 6-7 16,-6 12-2-16,3 11-4 15,-2 11-1-15,8 8-2 16,-4 8 7-16,6 14-1 16,-4 2 5-16,4 12 2 15,-10-2 3-15,3 7 2 16,-11-11 0-16,-2 3 2 15,-8-13 1-15,-4-7 5 16,-6-14 6-16,-2-4 29 16,-2-8 15-16,0-14-4 15,2-8-10-15,2-23-21 16,2-6-27-16,6-25-17 16,0-1 2-16,7-12 6 15,2 16 16-15,1-1 0 0,-1 28 2 16,6 11-2-16,-3 22 0 15,12 11-8-15,1 10-2 16,14 11-3-16,0 10 1 16,6 18-2-16,-7 3-6 15,-1 14-32-15,-9-3-19 16,-7-4-65-16,-15-18-48 16,-1-13-59-16,-8-20-7 15,-5-33-40-15</inkml:trace>
   <inkml:trace contextRef="#ctx0" brushRef="#br0" timeOffset="9997.83">16901 2450 561 0,'30'-43'112'0,"21"4"55"16,9 11-171-16,28 3-37 16,12 5-9-16,26 5-5 15,-7 8 3-15,17 5 20 16,-22 3 37-16,-1 14 33 15,-30 5 25-15,-7 6 15 16,-27 4-7-16,-8 11-2 16,-18-8-17-16,-5 1-14 15,-13-9-16-15,-1-5 49 16,-3-14 1-16,9-2 7 0,12-12-3 16,33-15-18-16,16-8-101 15,29-29-236-15,3-18 33 16</inkml:trace>
   <inkml:trace contextRef="#ctx0" brushRef="#br0" timeOffset="10082.17">18695 1392 523 0,'-92'-32'0'0</inkml:trace>
   <inkml:trace contextRef="#ctx0" brushRef="#br0" timeOffset="10576.16">16677 1321 440 0,'-222'-3'54'0,"-35"-9"71"16,22-6-140-16,-32-2 15 15,19 6 7-15,-31 9 1 16,24 5-2-16,-35 6 20 16,39 13 11-16,-21 14 14 15,40 7 3-15,-10 17-4 16,34 8-19-16,-8 30-8 15,38 5-12-15,-12 30-4 16,38 7-2-16,6 34-4 0,36-18-2 16,12 49-8-1,44-17-2-15,24 15-4 16,37-32 1-16,34 2 0 0,27-57 6 16,40-15 5-16,13-42 9 15,42-24 8-15,8-26 6 16,45-29 12-16,-3-18 4 15,38-32 11-15,-21-4 6 16,26-24 13-16,-31 8-8 0,14-18 0 16,-29 11-14-16,11-21-12 15,-37 15-15-15,2-24 3 16,-40 6 1-16,-22-21 25 16,-47 16 5-16,-30-26 28 15,-36 11 21-15,-39-4-7 16,-25 33-36-16,-43-2-29 15,-11 38-47-15,-50 26-62 16,-1 32-11-16,-25 22-45 16,30 30-17-16,3 22-116 15,55 9-28-15,39 19-50 16</inkml:trace>
@@ -3428,7 +3388,7 @@
 </inkml:ink>
 </file>
 
-<file path=ppt/ink/ink5.xml><?xml version="1.0" encoding="utf-8"?>
+<file path=ppt/ink/ink4.xml><?xml version="1.0" encoding="utf-8"?>
 <inkml:ink xmlns:inkml="http://www.w3.org/2003/InkML">
   <inkml:definitions>
     <inkml:context xml:id="ctx0">
@@ -3461,7 +3421,7 @@
 </inkml:ink>
 </file>
 
-<file path=ppt/ink/ink6.xml><?xml version="1.0" encoding="utf-8"?>
+<file path=ppt/ink/ink5.xml><?xml version="1.0" encoding="utf-8"?>
 <inkml:ink xmlns:inkml="http://www.w3.org/2003/InkML">
   <inkml:definitions>
     <inkml:context xml:id="ctx0">
@@ -3496,11 +3456,11 @@
   <inkml:trace contextRef="#ctx0" brushRef="#br0" timeOffset="57417.7">22480 7792 1193 0,'-16'-15'217'16,"24"7"61"-16,-1 7-451 15,6 11-34-15,12 20-70 16,5 13-59-16,8 19 33 0</inkml:trace>
   <inkml:trace contextRef="#ctx0" brushRef="#br0" timeOffset="57702.87">23054 7987 1139 0,'17'-37'250'0,"-9"-11"108"16,3 11-347-16,-2 13-31 16,-2 6-135-16,-5 14-71 0,-8 21-2 15,-7 20 10-15,-15 26 22 16,-3 11 135-16,0 16 64 15,4-8 2-15,14-4 27 16,23-20 5-16,18-10 35 16,13-19 25-16,26-16 46 15,6-19-12-15,20-18 4 16,0-12-35-16,19-12-25 16,-7-2-46-16,9-4-63 15,-16 6-72-15,-2 3-199 16,-25 11-6-16</inkml:trace>
   <inkml:trace contextRef="#ctx0" brushRef="#br0" timeOffset="58419.13">20806 10681 558 0,'-8'13'196'0,"30"-21"-5"16,23-23-111-16,42-22-114 16,39-22 2-16,62-37 26 15,17-2 6-15,59-38 7 16,1-4 6-16,44-17 19 15,-33 14 11-15,41-23 22 16,-47 33-4-16,12 4-1 16,-58 28-19-16,-2 14-15 15,-72 38-32-15,-24 17-103 16,-54 26-59-16,-31 28-94 16,-51 25-86-16</inkml:trace>
-  <inkml:trace contextRef="#ctx0" brushRef="#br0" timeOffset="58634.72">21786 10809 1349 0,'30'23'271'0,"22"-48"129"15,55-48-371-15,44-20-75 16,97-47 30-16,24-7 11 0,92-31-23 15,-10 8-18-15,45-9-97 16,-51 29-85-16,18-11-166 16,-84 35-47-16</inkml:trace>
+  <inkml:trace contextRef="#ctx0" brushRef="#br0" timeOffset="58634.71">21786 10809 1349 0,'30'23'271'0,"22"-48"129"15,55-48-371-15,44-20-75 16,97-47 30-16,24-7 11 0,92-31-23 15,-10 8-18-15,45-9-97 16,-51 29-85-16,18-11-166 16,-84 35-47-16</inkml:trace>
 </inkml:ink>
 </file>
 
-<file path=ppt/ink/ink7.xml><?xml version="1.0" encoding="utf-8"?>
+<file path=ppt/ink/ink6.xml><?xml version="1.0" encoding="utf-8"?>
 <inkml:ink xmlns:inkml="http://www.w3.org/2003/InkML">
   <inkml:definitions>
     <inkml:context xml:id="ctx0">
@@ -3527,7 +3487,7 @@
     </inkml:brush>
   </inkml:definitions>
   <inkml:trace contextRef="#ctx0" brushRef="#br0">22398 5748 452 0,'24'-7'126'0,"6"-9"28"16,-10-5-124-16,22-5-19 16,15-3-7-16,33-12 4 15,3-4 2-15,31-12 0 16,0 3-1-16,26-6 0 16,-15 6-2-16,29-13-2 15,-19 4 0-15,20-11 7 16,-22 3 3-16,12-5 4 15,-26 14 0-15,12-1 0 16,-25 17-7-16,5-2-5 16,-26 13-7-16,-12 6-38 15,-28 11-43-15,-14 8-109 16,-24 15-14-16</inkml:trace>
-  <inkml:trace contextRef="#ctx0" brushRef="#br0" timeOffset="356.98">22950 6109 782 0,'-21'31'186'0,"8"-14"79"15,14-27-262-15,11-10 49 16,18-6-38-16,36-18-8 16,23-7-12-16,38-15-2 15,5 1 4-15,35-11-2 16,-16 3 3-16,20-18-1 16,-20 11 2-16,16-8 2 15,-33 12 1-15,2 3-1 16,-31 20 2-16,-8 0 0 15,-35 16 0-15,-12 7 0 16,-24 11-15-16,-11 6-64 16,-11 10-54-16,-8 1-126 15,-6 8-39-15</inkml:trace>
+  <inkml:trace contextRef="#ctx0" brushRef="#br0" timeOffset="356.97">22950 6109 782 0,'-21'31'186'0,"8"-14"79"15,14-27-262-15,11-10 49 16,18-6-38-16,36-18-8 16,23-7-12-16,38-15-2 15,5 1 4-15,35-11-2 16,-16 3 3-16,20-18-1 16,-20 11 2-16,16-8 2 15,-33 12 1-15,2 3-1 16,-31 20 2-16,-8 0 0 15,-35 16 0-15,-12 7 0 16,-24 11-15-16,-11 6-64 16,-11 10-54-16,-8 1-126 15,-6 8-39-15</inkml:trace>
   <inkml:trace contextRef="#ctx0" brushRef="#br0" timeOffset="1848.48">25845 4391 469 0,'75'-54'133'16,"-34"0"93"-16,-17-8-120 15,-16 11 68-15,-13-8 10 16,-10 7-89-16,-23-7-38 15,-15 11-65-15,-44-4-40 16,-23 12-22-16,-45-13-2 16,-12 3 18-16,-42-13 19 15,11 1 30-15,-35-16 15 16,15 16 4-16,-41-1 3 16,18 12-1-16,-47-1-5 15,31 14-4-15,-43 0-4 0,33 7-2 16,-41 4-3-16,34 10 1 15,-47 1 0-15,42 2 1 16,-43-3-1-16,39-1 2 16,-31-8 0-16,42 3 1 15,-36-6-1-15,41 5 0 16,-38-3 0-16,41 4 0 16,-39 0 3-16,35 4 0 15,-34-1 4-15,33 8 1 16,-40 2-2-16,36 5-2 15,-35 5 1-15,39 3-5 0,-30-3 0 16,43 0 3-16,-29-4 10 16,38 1 2-16,-37 5-1 15,41 7 1-15,-47 8-3 16,29 6-9-16,-40 18-6 16,37 1 1-16,-39 5-1 15,52 0 1-15,-30 6-3 16,46-11 5-16,-33 10-2 15,38-6 2-15,-33 8-2 16,40-5 2-16,-28 13-2 16,45-11 0-16,-25 15 0 15,42-1 0-15,-16 4-3 16,34-8 3-16,-11 10-2 16,31-8-1-16,-14 9-1 15,34 2 2-15,-9 13-4 16,23-7-2-16,-6 15-8 0,23-10-1 15,-3 13-3-15,21-10 2 16,-2 9-6-16,24-11 7 16,4 17-8-16,18-11-2 15,10 14-11-15,17-10 3 16,15 9-8-16,18-18-3 16,20 8-6-16,16-18 12 0,31 5 3 15,9-20 12-15,29 0 12 16,8-17 10-16,28-6 1 15,-3-10 1-15,37-3 0 16,-9-8 1-16,35-3 0 16,-15-6 0-16,35 2 0 15,-25-4 2-15,32 3-2 16,-28-2 1-16,37 6 1 16,-28-6 0-16,38 2-1 15,-30-2 0-15,48 2 1 16,-29-6-1-16,39 3-1 15,-29-1 2-15,43-1 1 16,-38 0 0-16,29 7 1 16,-39 2-1-16,36 5 7 15,-37 3-1-15,36 7-3 16,-30-7 1-16,39 3 0 0,-37-5-6 16,40 2 0-16,-32-11 1 15,43 5 6-15,-29-5 0 16,41-1-1-16,-39-3 0 15,27 0-1-15,-44-5-2 16,26 3-3-16,-52-3 2 16,27 2-2-16,-38-2 2 15,26 3-2-15,-37-8 2 0,48-4 5 16,-36-5-1-16,26-6 1 16,-33-2-1-16,31-9 2 15,-43-1-3-15,31-8 1 16,-24-5 1-16,33-8 0 15,-31 5-2-15,28-8-1 16,-34 3 0-16,17-4-2 16,-32 4 1-16,20-16 0 15,-32 3-1-15,23-9-1 16,-23 4 0-16,25-8 0 16,-27 13 0-16,10-5 0 15,-32 9 1-15,7-10 1 16,-37 10 0-16,5-11 0 15,-20 6 0-15,8-5 0 0,-20 7 0 16,1-12 3 0,-26 6 4-16,-15-6 39 0,-27 7 8 15,-12-7 29-15,-20 12 1 16,-9-7 8-16,-7 6-34 16,-15-9-8-16,-8 7-30 15,-21-7-6-15,-7 12-14 16,-25 0-9-16,0 13-2 0,-28 0-5 15,-2 14-21-15,-39 4-83 16,-9 14-72 0,-55 19-109-16,8 18-67 0</inkml:trace>
   <inkml:trace contextRef="#ctx0" brushRef="#br0" timeOffset="7447.11">15801 8575 273 0,'-7'5'114'0,"3"-7"-2"16,0-2-56-16,7 0-53 15,-3 3-4-15,0 0 0 16,1 0 0-16,17-9 0 16,42-24 3-16,-26 12 0 15,-2 0-1-15,10-3 1 0,2-3 0 16,10-6 9-16,-1 7 8 15,9-5 16-15,-8 2 5 16,7-1 10-16,-6 5-9 16,10-2-7-16,-3 9-15 15,11 0-7-15,-9 6-10 16,11 1-2-16,-9 5 1 16,8 3-1-16,-10 4 1 15,16 2 0-15,-12 3 1 16,12-1 1-16,-7 2-2 15,10-1 2-15,-9-4-1 0,16 4 1 16,-12-4 0-16,13-2 3 16,-9 1-2-16,12 0 1 15,-13-2-1-15,13 4-1 16,-15-1-1-16,12 2-1 16,-15 1 0-16,9-2 1 15,-8 3 0-15,9 0 0 16,-6-1-1-16,12-3 2 15,-7 1-2-15,15-2-1 16,-12 0 1-16,10 0-1 16,-9 1 0-16,8-1 1 15,-9 0-1-15,12 0 1 0,-2-2 2 16,17 0-1-16,-8-4 1 16,16 0-1-16,-14-2 0 15,3-3-1-15,-18 0 0 16,6 2 2-16,-21-3 3 15,3 2 3-15,-14 4 0 16,1-1 1-16,-16 2-2 16,0 1-2-16,-14 2-4 15,-4 0-1-15,-13 2 0 16,-2 2 1-16,-11-3 1 16,-3 1 1-16,-3 1-1 0,-1-2-3 15,-2 0-3-15,0 1-26 16,0 0-24-16,1 0-75 15,13 2-64-15,11 4-24 16</inkml:trace>
   <inkml:trace contextRef="#ctx0" brushRef="#br0" timeOffset="8689.51">23448 8419 63 0,'1'6'19'16,"9"-7"21"-16,3-2-13 15,9 0-12-15,4 1 6 0,7 1-6 16,-1 0-15-16,10-2 1 16,-1-1-1-16,9-2-6 15,-9-2 31-15,7 0 7 16,-6-1 5-16,13-4 3 15,-8 0 7-15,13 2-30 16,0-1-7-16,5 1-4 16,-6 6-5-16,4 0 1 15,-7 2 0-15,10 0 8 16,-7 0 5-16,5 0 2 16,-2 2-1-16,6 1-1 0,-9 1-6 15,6-1 2-15,-7 1 4 16,6-2 15-16,-11-2 4 15,7-1 4-15,-6-1-7 16,7-2-4-16,-2 3-15 16,12-1-5-16,-6-1-5 15,15 1 0-15,-6 0 0 16,12-1 5-16,-10 2 0 16,8 0 1-16,-8 2-1 0,9 1-1 15,-8-1-3-15,11 4-2 16,-7-2 0-16,12 1 1 15,-12 1 4-15,10-2 14 16,-12 0 2-16,14 0 1 16,-16 1 0-16,15-1-4 15,-7 1-14-15,10-2-1 16,-11 0-2-16,13-1 7 16,-14-2 6-16,7 0 6 15,-11-1 0-15,13 0 1 16,-15 0-7-16,8-1-7 15,-10 3-4-15,6-3 0 16,-18 0 4-16,4 3 9 16,-14-3 3-16,0 0 3 15,-13 4-1-15,-2-2-2 16,-12 1-8-16,-1 2-1 0,-10-2-3 16,-1 2-3-16,-4 1-2 15,2 4-38-15,0-3-38 16,2 9-111-16,-6 2-45 15,-5 2-55-15</inkml:trace>
@@ -3543,7 +3503,7 @@
 </inkml:ink>
 </file>
 
-<file path=ppt/ink/ink8.xml><?xml version="1.0" encoding="utf-8"?>
+<file path=ppt/ink/ink7.xml><?xml version="1.0" encoding="utf-8"?>
 <inkml:ink xmlns:inkml="http://www.w3.org/2003/InkML">
   <inkml:definitions>
     <inkml:context xml:id="ctx0">
@@ -3588,13 +3548,13 @@
   <inkml:trace contextRef="#ctx0" brushRef="#br0" timeOffset="15217.93">15537 11396 628 0,'-11'15'179'0,"1"-10"32"16,5-9-217-16,13-3-62 15,10 0-6-15,24-12 1 16,10-7 4-16,27-14 49 16,8-6 22-16,28-15 0 15,-8 6-1-15,23-10 0 16,-9 8 0-16,21-14-1 15,-20 8 1-15,26-17 0 16,-13 7 0-16,18-7 3 0,-25 13 2 16,11-6 5-1,-24 20 0-15,-2-1 0 0,-28 13-4 16,-2 4 0 0,-24 12-5-16,-8 5-4 0,-19 9-7 15,-8 3-24-15,-11 6-5 16,-6 0 2-16,-6 2-4 15,-5-2-106-15,3 1 63 16</inkml:trace>
   <inkml:trace contextRef="#ctx0" brushRef="#br0" timeOffset="15591.63">17155 10151 353 0,'-66'-5'61'0,"-2"4"41"15,13 4-99-15,-3 0-15 16,21 0 14-16,9 3 5 16,13-3-4-16,7-2-14 15,8 1-2-15,10 1-1 16,3-3-4-16,16 3 12 16,9-2 23-16,21 1 8 15,3 1 1-15,16 1 4 16,-5 0-9-16,16 1-2 15,-7 1-6-15,15 0 2 16,-10-2-3-16,7 6-1 16,-17-2-7-16,-7 6-2 0,-22-3-1 15,-10 11 8-15,-19 3 4 16,-13 18 18-16,-14 2 10 16,-20 18 9-16,-9 5-6 15,-16 22-3-15,-3 0-15 16,-12 19-9-16,13-4-58 0,-5 14-142 15,11-8 29-15</inkml:trace>
   <inkml:trace contextRef="#ctx0" brushRef="#br0" timeOffset="16158.16">15923 13578 349 0,'-11'11'80'15,"6"-3"-1"-15,10-6-88 16,8-1-34-16,6-2 0 16,15-3 34-16,5-6 20 0,16-5 5 15,3-6 5 1,16-15 14-16,-3-3 2 0,19-12 16 15,-2-3 6-15,18-16 16 16,-5 9-6-16,24-11 0 16,-8 4-17-16,20-7-8 15,-16 14-21-15,30-11-8 16,-21 10-9-16,22-10 1 16,-15 9-3-16,26-11 5 15,-31 12 0-15,15 1-1 16,-28 11-2-16,2 1 1 15,-29 12-6-15,-7 0 0 16,-24 8-1-16,-9 6 1 16,-23 7-1-16,-6 4-20 15,-13 7-29-15,-2 1-66 0,-3-2-43 16,1-4-50-16,-2-5-47 16</inkml:trace>
-  <inkml:trace contextRef="#ctx0" brushRef="#br0" timeOffset="16568.63">18265 12018 796 0,'-40'2'161'0,"4"-1"80"16,13 2-239-16,4 0-7 15,12-2-7-15,4 1-27 16,3-1-21-16,0-2-5 15,0 1 6-15,1-1 9 16,13-1 28-16,23-4 25 16,38-9 6-16,-21 6 0 15,-1 0-2-15,9 3-2 16,-6 2-3-16,4 4-2 16,-11 0-1-16,5 5 1 15,-9 2-1-15,2 0 0 16,-6 1-1-16,-2 6-1 15,-10 1-1-15,-6 4 0 16,-9 3 3-16,-10 8 3 16,-5 5 4-16,-10 19 6 0,-9 4 1 15,-19 20 6-15,-6 3-2 16,-20 17 1-16,-3-3-4 16,-11 13-1-16,5-9-15 15,-9 11-144-15,15-7-59 16,-5 8-35-16</inkml:trace>
+  <inkml:trace contextRef="#ctx0" brushRef="#br0" timeOffset="16568.62">18265 12018 796 0,'-40'2'161'0,"4"-1"80"16,13 2-239-16,4 0-7 15,12-2-7-15,4 1-27 16,3-1-21-16,0-2-5 15,0 1 6-15,1-1 9 16,13-1 28-16,23-4 25 16,38-9 6-16,-21 6 0 15,-1 0-2-15,9 3-2 16,-6 2-3-16,4 4-2 16,-11 0-1-16,5 5 1 15,-9 2-1-15,2 0 0 16,-6 1-1-16,-2 6-1 15,-10 1-1-15,-6 4 0 16,-9 3 3-16,-10 8 3 16,-5 5 4-16,-10 19 6 0,-9 4 1 15,-19 20 6-15,-6 3-2 16,-20 17 1-16,-3-3-4 16,-11 13-1-16,5-9-15 15,-9 11-144-15,15-7-59 16,-5 8-35-16</inkml:trace>
   <inkml:trace contextRef="#ctx0" brushRef="#br0" timeOffset="17070.77">17149 15820 658 0,'5'-1'118'16,"7"-8"73"-16,8-2-195 16,24-13-4-16,12-10 8 15,33-12 1-15,0-7-1 16,19-10 0-16,-8 3-1 16,18-5 0-16,-14 4 2 15,18-6 11-15,-8 6 8 16,21-15 25-16,-14 5 12 15,20-16 18-15,-13 13-6 0,18-2 0 16,-23 15-23-16,13-1-12 16,-21 19-20-16,4-8-3 15,-26 11-8-15,0 4-1 16,-25 11-1-16,-5 5-15 16,-25 11-26-16,-4 2-79 15,-14 6-63-15,-7 0-100 16,-8 2-51-16</inkml:trace>
   <inkml:trace contextRef="#ctx0" brushRef="#br0" timeOffset="17458.72">18864 14239 987 0,'-38'14'254'0,"8"-30"86"15,5 10-276-15,12 3-39 16,5-2-14-16,7 3-36 16,3 2-47-16,8-3-1 15,13-1 3-15,8-2 12 16,14-4 19-16,4-1 39 16,8 2 0-16,-10 2-1 0,4 4-1 15,-10 6-1-15,7 7-1 16,-3 4 1-16,5 10 0 15,-1 2 0-15,5 4 1 16,-7 2 1-16,-2 6-1 16,-10-6 1-16,-5 11 1 15,-12 1 1-15,-7 9 11 16,-10 1 8-16,-11 12 20 16,-7-7 4-16,-12 7 6 15,-6-3-8-15,-30 27-6 16,-10 10 0-16,-44 63-345 15,-17 30 115-15</inkml:trace>
 </inkml:ink>
 </file>
 
-<file path=ppt/ink/ink9.xml><?xml version="1.0" encoding="utf-8"?>
+<file path=ppt/ink/ink8.xml><?xml version="1.0" encoding="utf-8"?>
 <inkml:ink xmlns:inkml="http://www.w3.org/2003/InkML">
   <inkml:definitions>
     <inkml:context xml:id="ctx0">
@@ -3633,7 +3593,7 @@
   <inkml:trace contextRef="#ctx0" brushRef="#br0" timeOffset="15572.66">16581 14556 471 0,'-14'38'24'0,"-2"19"81"15,9 14-159-15,6 20-1 16,4-1 8 0,4 13-55-16,3-20-4 0,1-3-25 15</inkml:trace>
   <inkml:trace contextRef="#ctx0" brushRef="#br0" timeOffset="15989.15">16873 13312 979 0,'-2'12'188'0,"1"-18"78"15,3 23-276 1,1 14-50-16,-2 30 2 0,2 21 36 16,-1 35 3-16,-3 1-1 15,0 36-2-15,0-9 4 16,-5 26 2-16,2-13 1 0,-1 26 7 15,-2-26 6-15,5 23 2 16,-3-21 1-16,-5 10 0 16,5-33 0-16,2 2-1 15,-3-34 1-15,7-7-53 16,5-25-42-16,1-3-111 16,0-17-29-16,3-8-69 15</inkml:trace>
   <inkml:trace contextRef="#ctx0" brushRef="#br0" timeOffset="16328.97">16832 13380 930 0,'-8'-10'303'0,"-3"6"31"16,-2 2-234-16,-4 9-163 15,-7 25-5-15,-3 14 1 0,-16 33 1 16,-3 18 22-16,-8 24 20 16,5-5 10-16,-2 20-6 15,10-23-4-15,3-2-13 16,14-28-5-16,5-19-42 15,9-31-15-15,5-15-26 16,9-20-5-16,7-20-24 16,7-10 12-16,13-31-8 15,6-16-7-15</inkml:trace>
-  <inkml:trace contextRef="#ctx0" brushRef="#br0" timeOffset="16907.81">16645 13761 382 0,'17'-43'290'0,"-6"11"-48"16,-5 17-91-16,-1 3-50 15,6 8-74-15,8 0-24 16,7 5-11-16,13 8 0 16,5 5 2-16,13 9 1 15,0 4 3-15,6 7 1 0,-7-1-1 16,0 5 0-16,-10-4 0 16,5 1 1-16,-8-6 0 15,1 1 1-15,-4-8 0 16,-1-5 2-16,-11-5 0 15,-5-3 3-15,-8-4 0 16,-4-2 1-16,-5-3 0 16,0 1-1-16,-4-2-1 0,-2 0 7 15,0 1 8 1,0 0 20-16,0 0 7 0,0 0 12 16,0 0-1-16,0 0 2 15,0 0-14-15,0 0 2 16,0 0-10-16,0 0-3 15,0 0-10-15,0 0-3 16,0 0-6-16,0 0 7 16,0 0 2-16,0 0 9 15,0 0-1-15,0 0 1 16,0 0-9-16,0 0-5 16,0 0-10-16,0 0-3 15,0 0-3-15,0 0-2 16,0 0-1-16,0 0 1 0,0 0 0 15,0 0 1-15,0 0 0 16,0 0 1-16,0 0 0 16,0 0-2-16,0 0 1 15,0 0-4-15,0 0-4 16,0 0-11-16,0 0-9 16,0 0-24-16,0 0-11 15,0 0-26-15,0 0-4 16,0-2-49-16,0 1-19 0,1 0-163 15,0 0 16 1</inkml:trace>
+  <inkml:trace contextRef="#ctx0" brushRef="#br0" timeOffset="16907.8">16645 13761 382 0,'17'-43'290'0,"-6"11"-48"16,-5 17-91-16,-1 3-50 15,6 8-74-15,8 0-24 16,7 5-11-16,13 8 0 16,5 5 2-16,13 9 1 15,0 4 3-15,6 7 1 0,-7-1-1 16,0 5 0-16,-10-4 0 16,5 1 1-16,-8-6 0 15,1 1 1-15,-4-8 0 16,-1-5 2-16,-11-5 0 15,-5-3 3-15,-8-4 0 16,-4-2 1-16,-5-3 0 16,0 1-1-16,-4-2-1 0,-2 0 7 15,0 1 8 1,0 0 20-16,0 0 7 0,0 0 12 16,0 0-1-16,0 0 2 15,0 0-14-15,0 0 2 16,0 0-10-16,0 0-3 15,0 0-10-15,0 0-3 16,0 0-6-16,0 0 7 16,0 0 2-16,0 0 9 15,0 0-1-15,0 0 1 16,0 0-9-16,0 0-5 16,0 0-10-16,0 0-3 15,0 0-3-15,0 0-2 16,0 0-1-16,0 0 1 0,0 0 0 15,0 0 1-15,0 0 0 16,0 0 1-16,0 0 0 16,0 0-2-16,0 0 1 15,0 0-4-15,0 0-4 16,0 0-11-16,0 0-9 16,0 0-24-16,0 0-11 15,0 0-26-15,0 0-4 16,0-2-49-16,0 1-19 0,1 0-163 15,0 0 16 1</inkml:trace>
   <inkml:trace contextRef="#ctx0" brushRef="#br0" timeOffset="17673.04">20500 13537 1190 0,'6'-1'228'16,"-5"1"116"-16,0 0-359 15,-1 0-48-15,0 1 14 16,-1 27 0-16,-1 64 8 15,0-11 16-15,0 9 24 16,5 22 5-16,-3-8-1 16,2 16 1-16,3-8 0 15,5 27 0-15,0-9-2 16,5 24 0-16,2-8-1 0,-1 26-10 16,-4-21-7-16,5 18-27 15,-4-22-41-15,-2 7-47 16,0-31-5-16,0-4-60 15,-8-35 12-15,-1-15-41 16,1-31 4-16</inkml:trace>
   <inkml:trace contextRef="#ctx0" brushRef="#br0" timeOffset="18207.12">20634 13094 1012 0,'1'-15'217'16,"-3"10"92"-16,0 6-307 16,-10 9-17-16,-4 11-11 15,-16 28-1-15,-11 16 2 16,-18 35 6-16,0 14 15 15,-14 34 5-15,7-11 2 16,0 20-1-16,15-23-2 0,9-13 0 16,20-37 1-16,6-24 1 15,12-33 9-15,3-15 2 16,2-11 0-16,2-12-4 16,10-10-5-16,13-28-19 15,7-24-16-15,14-33-27 16,2-9 4-16,-1-9 16 15,-10 23 23-15,-3 21 35 16,-11 30 31-16,5 14-1 16,-2 18-13-16,13 6-15 15,0 2-20-15,12 6-4 16,-5 7-6-16,6 10 3 16,-8 9 3-16,7 22 1 15,-12 9 1-15,2 13 7 16,-7 1-4-16,2 7 0 15,-6-14 0-15,5 2-3 16,-6-11 1-16,0 0-7 0,-6-14-9 16,-2-4-37-16,-3-13-44 15,6-9-195-15,4-14 20 16</inkml:trace>
   <inkml:trace contextRef="#ctx0" brushRef="#br0" timeOffset="19737.74">21081 12799 804 0,'-57'65'90'16,"-15"0"116"-16,0-1-251 15,-16 6 21-15,6-16 25 16,-11-9 13-16,4-20 6 16,-25-14 17-16,0-19-3 15,-29-17 9-15,6-10 8 16,-13-16 27-16,26-4 8 0,2-12 21 15,28-1-9-15,-2-25-14 16,23 0-32-16,-7-29-27 16,12-8-27-16,-2-36-3 15,20-1-4-15,0-41-6 16,22 1-6-16,20-38-13 16,21 10-6-16,25-36-49 15,19 33-3-15,24-24 8 16,12 35 23-16,28 1 8 15,-4 48 49-15,41-10 7 16,0 41 0-16,44 5-1 16,-8 30-1-16,36 11 0 15,-29 34-1-15,11 27 0 16,-40 34 0-16,-1 29-3 16,-40 24 0-16,6 40-3 15,-26 17 2-15,-1 38-1 0,-24 8 1 16,-6 38 0-16,-23-9 1 15,-10 29 0-15,-24-17 2 16,-9 33 1-16,-15-17 2 16,-10 33 0-16,-6-23 0 15,-14 39 0-15,-2-33-1 16,-15 11 2-16,-5-51-2 16,-17-13 23-16,1-58 16 15,-22-18 27-15,-7-41 10 16,-41-4 16-16,1-19-16 0,-37-10 2 15,9-13-13-15,-5-15-3 16,29-13-16-16,-10-12-22 16,36-4-20-16,0-10-15 15,23 5-11-15,7-7-46 16,29 0-17-16,18-18-287 16,24-1 40-16</inkml:trace>
@@ -3976,7 +3936,7 @@
           <a:p>
             <a:fld id="{0FC636AB-7ECB-49D5-A3CD-FAFC6A31BE2F}" type="datetimeFigureOut">
               <a:rPr lang="en-IN" smtClean="0"/>
-              <a:t>14-03-2020</a:t>
+              <a:t>04-06-2020</a:t>
             </a:fld>
             <a:endParaRPr lang="en-IN"/>
           </a:p>
@@ -4300,7 +4260,7 @@
           <a:p>
             <a:fld id="{0FC636AB-7ECB-49D5-A3CD-FAFC6A31BE2F}" type="datetimeFigureOut">
               <a:rPr lang="en-IN" smtClean="0"/>
-              <a:t>14-03-2020</a:t>
+              <a:t>04-06-2020</a:t>
             </a:fld>
             <a:endParaRPr lang="en-IN"/>
           </a:p>
@@ -4548,7 +4508,7 @@
           <a:p>
             <a:fld id="{0FC636AB-7ECB-49D5-A3CD-FAFC6A31BE2F}" type="datetimeFigureOut">
               <a:rPr lang="en-IN" smtClean="0"/>
-              <a:t>14-03-2020</a:t>
+              <a:t>04-06-2020</a:t>
             </a:fld>
             <a:endParaRPr lang="en-IN"/>
           </a:p>
@@ -4887,7 +4847,7 @@
           <a:p>
             <a:fld id="{0FC636AB-7ECB-49D5-A3CD-FAFC6A31BE2F}" type="datetimeFigureOut">
               <a:rPr lang="en-IN" smtClean="0"/>
-              <a:t>14-03-2020</a:t>
+              <a:t>04-06-2020</a:t>
             </a:fld>
             <a:endParaRPr lang="en-IN"/>
           </a:p>
@@ -5234,7 +5194,7 @@
           <a:p>
             <a:fld id="{0FC636AB-7ECB-49D5-A3CD-FAFC6A31BE2F}" type="datetimeFigureOut">
               <a:rPr lang="en-IN" smtClean="0"/>
-              <a:t>14-03-2020</a:t>
+              <a:t>04-06-2020</a:t>
             </a:fld>
             <a:endParaRPr lang="en-IN"/>
           </a:p>
@@ -5608,7 +5568,7 @@
           <a:p>
             <a:fld id="{0FC636AB-7ECB-49D5-A3CD-FAFC6A31BE2F}" type="datetimeFigureOut">
               <a:rPr lang="en-IN" smtClean="0"/>
-              <a:t>14-03-2020</a:t>
+              <a:t>04-06-2020</a:t>
             </a:fld>
             <a:endParaRPr lang="en-IN"/>
           </a:p>
@@ -6078,7 +6038,7 @@
           <a:p>
             <a:fld id="{0FC636AB-7ECB-49D5-A3CD-FAFC6A31BE2F}" type="datetimeFigureOut">
               <a:rPr lang="en-IN" smtClean="0"/>
-              <a:t>14-03-2020</a:t>
+              <a:t>04-06-2020</a:t>
             </a:fld>
             <a:endParaRPr lang="en-IN"/>
           </a:p>
@@ -6283,7 +6243,7 @@
           <a:p>
             <a:fld id="{0FC636AB-7ECB-49D5-A3CD-FAFC6A31BE2F}" type="datetimeFigureOut">
               <a:rPr lang="en-IN" smtClean="0"/>
-              <a:t>14-03-2020</a:t>
+              <a:t>04-06-2020</a:t>
             </a:fld>
             <a:endParaRPr lang="en-IN"/>
           </a:p>
@@ -6494,7 +6454,7 @@
           <a:p>
             <a:fld id="{0FC636AB-7ECB-49D5-A3CD-FAFC6A31BE2F}" type="datetimeFigureOut">
               <a:rPr lang="en-IN" smtClean="0"/>
-              <a:t>14-03-2020</a:t>
+              <a:t>04-06-2020</a:t>
             </a:fld>
             <a:endParaRPr lang="en-IN"/>
           </a:p>
@@ -6726,7 +6686,7 @@
           <a:p>
             <a:fld id="{0FC636AB-7ECB-49D5-A3CD-FAFC6A31BE2F}" type="datetimeFigureOut">
               <a:rPr lang="en-IN" smtClean="0"/>
-              <a:t>14-03-2020</a:t>
+              <a:t>04-06-2020</a:t>
             </a:fld>
             <a:endParaRPr lang="en-IN"/>
           </a:p>
@@ -6974,7 +6934,7 @@
           <a:p>
             <a:fld id="{0FC636AB-7ECB-49D5-A3CD-FAFC6A31BE2F}" type="datetimeFigureOut">
               <a:rPr lang="en-IN" smtClean="0"/>
-              <a:t>14-03-2020</a:t>
+              <a:t>04-06-2020</a:t>
             </a:fld>
             <a:endParaRPr lang="en-IN"/>
           </a:p>
@@ -7272,7 +7232,7 @@
           <a:p>
             <a:fld id="{0FC636AB-7ECB-49D5-A3CD-FAFC6A31BE2F}" type="datetimeFigureOut">
               <a:rPr lang="en-IN" smtClean="0"/>
-              <a:t>14-03-2020</a:t>
+              <a:t>04-06-2020</a:t>
             </a:fld>
             <a:endParaRPr lang="en-IN"/>
           </a:p>
@@ -7666,7 +7626,7 @@
           <a:p>
             <a:fld id="{0FC636AB-7ECB-49D5-A3CD-FAFC6A31BE2F}" type="datetimeFigureOut">
               <a:rPr lang="en-IN" smtClean="0"/>
-              <a:t>14-03-2020</a:t>
+              <a:t>04-06-2020</a:t>
             </a:fld>
             <a:endParaRPr lang="en-IN"/>
           </a:p>
@@ -7815,7 +7775,7 @@
           <a:p>
             <a:fld id="{0FC636AB-7ECB-49D5-A3CD-FAFC6A31BE2F}" type="datetimeFigureOut">
               <a:rPr lang="en-IN" smtClean="0"/>
-              <a:t>14-03-2020</a:t>
+              <a:t>04-06-2020</a:t>
             </a:fld>
             <a:endParaRPr lang="en-IN"/>
           </a:p>
@@ -7941,7 +7901,7 @@
           <a:p>
             <a:fld id="{0FC636AB-7ECB-49D5-A3CD-FAFC6A31BE2F}" type="datetimeFigureOut">
               <a:rPr lang="en-IN" smtClean="0"/>
-              <a:t>14-03-2020</a:t>
+              <a:t>04-06-2020</a:t>
             </a:fld>
             <a:endParaRPr lang="en-IN"/>
           </a:p>
@@ -8196,7 +8156,7 @@
           <a:p>
             <a:fld id="{0FC636AB-7ECB-49D5-A3CD-FAFC6A31BE2F}" type="datetimeFigureOut">
               <a:rPr lang="en-IN" smtClean="0"/>
-              <a:t>14-03-2020</a:t>
+              <a:t>04-06-2020</a:t>
             </a:fld>
             <a:endParaRPr lang="en-IN"/>
           </a:p>
@@ -8511,7 +8471,7 @@
           <a:p>
             <a:fld id="{0FC636AB-7ECB-49D5-A3CD-FAFC6A31BE2F}" type="datetimeFigureOut">
               <a:rPr lang="en-IN" smtClean="0"/>
-              <a:t>14-03-2020</a:t>
+              <a:t>04-06-2020</a:t>
             </a:fld>
             <a:endParaRPr lang="en-IN"/>
           </a:p>
@@ -8869,7 +8829,7 @@
           <a:p>
             <a:fld id="{0FC636AB-7ECB-49D5-A3CD-FAFC6A31BE2F}" type="datetimeFigureOut">
               <a:rPr lang="en-IN" smtClean="0"/>
-              <a:t>14-03-2020</a:t>
+              <a:t>04-06-2020</a:t>
             </a:fld>
             <a:endParaRPr lang="en-IN"/>
           </a:p>
@@ -9906,172 +9866,6 @@
           </a:p>
         </p:txBody>
       </p:sp>
-      <p:sp>
-        <p:nvSpPr>
-          <p:cNvPr id="11" name="Rectangle 10">
-            <a:extLst>
-              <a:ext uri="{FF2B5EF4-FFF2-40B4-BE49-F238E27FC236}">
-                <a16:creationId xmlns:a16="http://schemas.microsoft.com/office/drawing/2014/main" id="{1C398C56-2A14-4E0D-9B96-19E16A98D91E}"/>
-              </a:ext>
-            </a:extLst>
-          </p:cNvPr>
-          <p:cNvSpPr/>
-          <p:nvPr/>
-        </p:nvSpPr>
-        <p:spPr>
-          <a:xfrm>
-            <a:off x="786062" y="4536660"/>
-            <a:ext cx="1137988" cy="254061"/>
-          </a:xfrm>
-          <a:prstGeom prst="rect">
-            <a:avLst/>
-          </a:prstGeom>
-          <a:solidFill>
-            <a:srgbClr val="92D050"/>
-          </a:solidFill>
-        </p:spPr>
-        <p:style>
-          <a:lnRef idx="1">
-            <a:schemeClr val="accent6"/>
-          </a:lnRef>
-          <a:fillRef idx="3">
-            <a:schemeClr val="accent6"/>
-          </a:fillRef>
-          <a:effectRef idx="2">
-            <a:schemeClr val="accent6"/>
-          </a:effectRef>
-          <a:fontRef idx="minor">
-            <a:schemeClr val="lt1"/>
-          </a:fontRef>
-        </p:style>
-        <p:txBody>
-          <a:bodyPr rtlCol="0" anchor="ctr"/>
-          <a:lstStyle/>
-          <a:p>
-            <a:pPr algn="ctr"/>
-            <a:r>
-              <a:rPr lang="en-IN" sz="2000" dirty="0" err="1">
-                <a:solidFill>
-                  <a:srgbClr val="FF0000"/>
-                </a:solidFill>
-                <a:latin typeface="Algerian" panose="04020705040A02060702" pitchFamily="82" charset="0"/>
-              </a:rPr>
-              <a:t>arvind</a:t>
-            </a:r>
-            <a:endParaRPr lang="en-IN" sz="1600" dirty="0">
-              <a:solidFill>
-                <a:srgbClr val="FF0000"/>
-              </a:solidFill>
-              <a:latin typeface="Algerian" panose="04020705040A02060702" pitchFamily="82" charset="0"/>
-            </a:endParaRPr>
-          </a:p>
-        </p:txBody>
-      </p:sp>
-      <p:sp>
-        <p:nvSpPr>
-          <p:cNvPr id="12" name="Rectangle: Diagonal Corners Snipped 11">
-            <a:extLst>
-              <a:ext uri="{FF2B5EF4-FFF2-40B4-BE49-F238E27FC236}">
-                <a16:creationId xmlns:a16="http://schemas.microsoft.com/office/drawing/2014/main" id="{CE12D427-46B8-4A2E-AD40-223EDECF5A7C}"/>
-              </a:ext>
-            </a:extLst>
-          </p:cNvPr>
-          <p:cNvSpPr/>
-          <p:nvPr/>
-        </p:nvSpPr>
-        <p:spPr>
-          <a:xfrm>
-            <a:off x="0" y="3729441"/>
-            <a:ext cx="1924050" cy="807219"/>
-          </a:xfrm>
-          <a:prstGeom prst="snip2DiagRect">
-            <a:avLst/>
-          </a:prstGeom>
-          <a:solidFill>
-            <a:srgbClr val="92D050"/>
-          </a:solidFill>
-        </p:spPr>
-        <p:style>
-          <a:lnRef idx="2">
-            <a:schemeClr val="accent1">
-              <a:shade val="50000"/>
-            </a:schemeClr>
-          </a:lnRef>
-          <a:fillRef idx="1">
-            <a:schemeClr val="accent1"/>
-          </a:fillRef>
-          <a:effectRef idx="0">
-            <a:schemeClr val="accent1"/>
-          </a:effectRef>
-          <a:fontRef idx="minor">
-            <a:schemeClr val="lt1"/>
-          </a:fontRef>
-        </p:style>
-        <p:txBody>
-          <a:bodyPr rtlCol="0" anchor="ctr"/>
-          <a:lstStyle/>
-          <a:p>
-            <a:pPr algn="ctr"/>
-            <a:r>
-              <a:rPr lang="en-IN" sz="2400" dirty="0">
-                <a:latin typeface="Algerian" panose="04020705040A02060702" pitchFamily="82" charset="0"/>
-              </a:rPr>
-              <a:t>GREEN LEARNER</a:t>
-            </a:r>
-          </a:p>
-        </p:txBody>
-      </p:sp>
-      <mc:AlternateContent xmlns:mc="http://schemas.openxmlformats.org/markup-compatibility/2006">
-        <mc:Choice xmlns:p14="http://schemas.microsoft.com/office/powerpoint/2010/main" Requires="p14">
-          <p:contentPart p14:bwMode="auto" r:id="rId2">
-            <p14:nvContentPartPr>
-              <p14:cNvPr id="4" name="Ink 3">
-                <a:extLst>
-                  <a:ext uri="{FF2B5EF4-FFF2-40B4-BE49-F238E27FC236}">
-                    <a16:creationId xmlns:a16="http://schemas.microsoft.com/office/drawing/2014/main" id="{915E1CEA-5676-407D-B7DB-2507AEA5B981}"/>
-                  </a:ext>
-                </a:extLst>
-              </p14:cNvPr>
-              <p14:cNvContentPartPr/>
-              <p14:nvPr/>
-            </p14:nvContentPartPr>
-            <p14:xfrm>
-              <a:off x="68040" y="952920"/>
-              <a:ext cx="11432880" cy="5580000"/>
-            </p14:xfrm>
-          </p:contentPart>
-        </mc:Choice>
-        <mc:Fallback>
-          <p:pic>
-            <p:nvPicPr>
-              <p:cNvPr id="4" name="Ink 3">
-                <a:extLst>
-                  <a:ext uri="{FF2B5EF4-FFF2-40B4-BE49-F238E27FC236}">
-                    <a16:creationId xmlns:a16="http://schemas.microsoft.com/office/drawing/2014/main" id="{915E1CEA-5676-407D-B7DB-2507AEA5B981}"/>
-                  </a:ext>
-                </a:extLst>
-              </p:cNvPr>
-              <p:cNvPicPr/>
-              <p:nvPr/>
-            </p:nvPicPr>
-            <p:blipFill>
-              <a:blip r:embed="rId3"/>
-              <a:stretch>
-                <a:fillRect/>
-              </a:stretch>
-            </p:blipFill>
-            <p:spPr>
-              <a:xfrm>
-                <a:off x="58680" y="943560"/>
-                <a:ext cx="11451600" cy="5598720"/>
-              </a:xfrm>
-              <a:prstGeom prst="rect">
-                <a:avLst/>
-              </a:prstGeom>
-            </p:spPr>
-          </p:pic>
-        </mc:Fallback>
-      </mc:AlternateContent>
     </p:spTree>
     <p:extLst>
       <p:ext uri="{BB962C8B-B14F-4D97-AF65-F5344CB8AC3E}">
@@ -10307,8 +10101,8 @@
           </a:p>
         </p:txBody>
       </p:sp>
-      <mc:AlternateContent xmlns:mc="http://schemas.openxmlformats.org/markup-compatibility/2006">
-        <mc:Choice xmlns:p14="http://schemas.microsoft.com/office/powerpoint/2010/main" Requires="p14">
+      <mc:AlternateContent xmlns:mc="http://schemas.openxmlformats.org/markup-compatibility/2006" xmlns:p14="http://schemas.microsoft.com/office/powerpoint/2010/main">
+        <mc:Choice Requires="p14">
           <p:contentPart p14:bwMode="auto" r:id="rId2">
             <p14:nvContentPartPr>
               <p14:cNvPr id="4" name="Ink 3">
@@ -10327,7 +10121,7 @@
             </p14:xfrm>
           </p:contentPart>
         </mc:Choice>
-        <mc:Fallback>
+        <mc:Fallback xmlns="">
           <p:pic>
             <p:nvPicPr>
               <p:cNvPr id="4" name="Ink 3">
@@ -10509,8 +10303,8 @@
           </a:p>
         </p:txBody>
       </p:sp>
-      <mc:AlternateContent xmlns:mc="http://schemas.openxmlformats.org/markup-compatibility/2006">
-        <mc:Choice xmlns:p14="http://schemas.microsoft.com/office/powerpoint/2010/main" Requires="p14">
+      <mc:AlternateContent xmlns:mc="http://schemas.openxmlformats.org/markup-compatibility/2006" xmlns:p14="http://schemas.microsoft.com/office/powerpoint/2010/main">
+        <mc:Choice Requires="p14">
           <p:contentPart p14:bwMode="auto" r:id="rId3">
             <p14:nvContentPartPr>
               <p14:cNvPr id="11" name="Ink 10">
@@ -10529,7 +10323,7 @@
             </p14:xfrm>
           </p:contentPart>
         </mc:Choice>
-        <mc:Fallback>
+        <mc:Fallback xmlns="">
           <p:pic>
             <p:nvPicPr>
               <p:cNvPr id="11" name="Ink 10">
@@ -11318,8 +11112,8 @@
           </a:p>
         </p:txBody>
       </p:sp>
-      <mc:AlternateContent xmlns:mc="http://schemas.openxmlformats.org/markup-compatibility/2006">
-        <mc:Choice xmlns:p14="http://schemas.microsoft.com/office/powerpoint/2010/main" Requires="p14">
+      <mc:AlternateContent xmlns:mc="http://schemas.openxmlformats.org/markup-compatibility/2006" xmlns:p14="http://schemas.microsoft.com/office/powerpoint/2010/main">
+        <mc:Choice Requires="p14">
           <p:contentPart p14:bwMode="auto" r:id="rId4">
             <p14:nvContentPartPr>
               <p14:cNvPr id="3" name="Ink 2">
@@ -11338,7 +11132,7 @@
             </p14:xfrm>
           </p:contentPart>
         </mc:Choice>
-        <mc:Fallback>
+        <mc:Fallback xmlns="">
           <p:pic>
             <p:nvPicPr>
               <p:cNvPr id="3" name="Ink 2">
@@ -12391,8 +12185,8 @@
           </a:p>
         </p:txBody>
       </p:sp>
-      <mc:AlternateContent xmlns:mc="http://schemas.openxmlformats.org/markup-compatibility/2006">
-        <mc:Choice xmlns:p14="http://schemas.microsoft.com/office/powerpoint/2010/main" Requires="p14">
+      <mc:AlternateContent xmlns:mc="http://schemas.openxmlformats.org/markup-compatibility/2006" xmlns:p14="http://schemas.microsoft.com/office/powerpoint/2010/main">
+        <mc:Choice Requires="p14">
           <p:contentPart p14:bwMode="auto" r:id="rId3">
             <p14:nvContentPartPr>
               <p14:cNvPr id="3" name="Ink 2">
@@ -12411,7 +12205,7 @@
             </p14:xfrm>
           </p:contentPart>
         </mc:Choice>
-        <mc:Fallback>
+        <mc:Fallback xmlns="">
           <p:pic>
             <p:nvPicPr>
               <p:cNvPr id="3" name="Ink 2">
@@ -12950,8 +12744,8 @@
           </a:p>
         </p:txBody>
       </p:sp>
-      <mc:AlternateContent xmlns:mc="http://schemas.openxmlformats.org/markup-compatibility/2006">
-        <mc:Choice xmlns:p14="http://schemas.microsoft.com/office/powerpoint/2010/main" Requires="p14">
+      <mc:AlternateContent xmlns:mc="http://schemas.openxmlformats.org/markup-compatibility/2006" xmlns:p14="http://schemas.microsoft.com/office/powerpoint/2010/main">
+        <mc:Choice Requires="p14">
           <p:contentPart p14:bwMode="auto" r:id="rId2">
             <p14:nvContentPartPr>
               <p14:cNvPr id="3" name="Ink 2">
@@ -12970,7 +12764,7 @@
             </p14:xfrm>
           </p:contentPart>
         </mc:Choice>
-        <mc:Fallback>
+        <mc:Fallback xmlns="">
           <p:pic>
             <p:nvPicPr>
               <p:cNvPr id="3" name="Ink 2">
@@ -13978,8 +13772,8 @@
           </a:p>
         </p:txBody>
       </p:sp>
-      <mc:AlternateContent xmlns:mc="http://schemas.openxmlformats.org/markup-compatibility/2006">
-        <mc:Choice xmlns:p14="http://schemas.microsoft.com/office/powerpoint/2010/main" Requires="p14">
+      <mc:AlternateContent xmlns:mc="http://schemas.openxmlformats.org/markup-compatibility/2006" xmlns:p14="http://schemas.microsoft.com/office/powerpoint/2010/main">
+        <mc:Choice Requires="p14">
           <p:contentPart p14:bwMode="auto" r:id="rId3">
             <p14:nvContentPartPr>
               <p14:cNvPr id="3" name="Ink 2">
@@ -13998,7 +13792,7 @@
             </p14:xfrm>
           </p:contentPart>
         </mc:Choice>
-        <mc:Fallback>
+        <mc:Fallback xmlns="">
           <p:pic>
             <p:nvPicPr>
               <p:cNvPr id="3" name="Ink 2">
@@ -14510,8 +14304,8 @@
           </a:p>
         </p:txBody>
       </p:sp>
-      <mc:AlternateContent xmlns:mc="http://schemas.openxmlformats.org/markup-compatibility/2006">
-        <mc:Choice xmlns:p14="http://schemas.microsoft.com/office/powerpoint/2010/main" Requires="p14">
+      <mc:AlternateContent xmlns:mc="http://schemas.openxmlformats.org/markup-compatibility/2006" xmlns:p14="http://schemas.microsoft.com/office/powerpoint/2010/main">
+        <mc:Choice Requires="p14">
           <p:contentPart p14:bwMode="auto" r:id="rId3">
             <p14:nvContentPartPr>
               <p14:cNvPr id="3" name="Ink 2">
@@ -14530,7 +14324,7 @@
             </p14:xfrm>
           </p:contentPart>
         </mc:Choice>
-        <mc:Fallback>
+        <mc:Fallback xmlns="">
           <p:pic>
             <p:nvPicPr>
               <p:cNvPr id="3" name="Ink 2">
@@ -15029,8 +14823,8 @@
           </a:graphicData>
         </a:graphic>
       </p:graphicFrame>
-      <mc:AlternateContent xmlns:mc="http://schemas.openxmlformats.org/markup-compatibility/2006">
-        <mc:Choice xmlns:p14="http://schemas.microsoft.com/office/powerpoint/2010/main" Requires="p14">
+      <mc:AlternateContent xmlns:mc="http://schemas.openxmlformats.org/markup-compatibility/2006" xmlns:p14="http://schemas.microsoft.com/office/powerpoint/2010/main">
+        <mc:Choice Requires="p14">
           <p:contentPart p14:bwMode="auto" r:id="rId7">
             <p14:nvContentPartPr>
               <p14:cNvPr id="3" name="Ink 2">
@@ -15049,7 +14843,7 @@
             </p14:xfrm>
           </p:contentPart>
         </mc:Choice>
-        <mc:Fallback>
+        <mc:Fallback xmlns="">
           <p:pic>
             <p:nvPicPr>
               <p:cNvPr id="3" name="Ink 2">

</xml_diff>